<commit_message>
making of photos, optimized size for photos
</commit_message>
<xml_diff>
--- a/Prototyping Materials.pptx
+++ b/Prototyping Materials.pptx
@@ -6,26 +6,27 @@
   </p:sldMasterIdLst>
   <p:sldIdLst>
     <p:sldId id="319" r:id="rId2"/>
-    <p:sldId id="318" r:id="rId3"/>
-    <p:sldId id="320" r:id="rId4"/>
-    <p:sldId id="321" r:id="rId5"/>
-    <p:sldId id="322" r:id="rId6"/>
-    <p:sldId id="323" r:id="rId7"/>
-    <p:sldId id="324" r:id="rId8"/>
-    <p:sldId id="325" r:id="rId9"/>
-    <p:sldId id="326" r:id="rId10"/>
-    <p:sldId id="327" r:id="rId11"/>
-    <p:sldId id="328" r:id="rId12"/>
-    <p:sldId id="329" r:id="rId13"/>
-    <p:sldId id="307" r:id="rId14"/>
-    <p:sldId id="308" r:id="rId15"/>
-    <p:sldId id="268" r:id="rId16"/>
-    <p:sldId id="315" r:id="rId17"/>
-    <p:sldId id="306" r:id="rId18"/>
-    <p:sldId id="305" r:id="rId19"/>
-    <p:sldId id="270" r:id="rId20"/>
-    <p:sldId id="313" r:id="rId21"/>
-    <p:sldId id="312" r:id="rId22"/>
+    <p:sldId id="330" r:id="rId3"/>
+    <p:sldId id="318" r:id="rId4"/>
+    <p:sldId id="320" r:id="rId5"/>
+    <p:sldId id="321" r:id="rId6"/>
+    <p:sldId id="322" r:id="rId7"/>
+    <p:sldId id="323" r:id="rId8"/>
+    <p:sldId id="324" r:id="rId9"/>
+    <p:sldId id="325" r:id="rId10"/>
+    <p:sldId id="326" r:id="rId11"/>
+    <p:sldId id="327" r:id="rId12"/>
+    <p:sldId id="328" r:id="rId13"/>
+    <p:sldId id="329" r:id="rId14"/>
+    <p:sldId id="307" r:id="rId15"/>
+    <p:sldId id="308" r:id="rId16"/>
+    <p:sldId id="268" r:id="rId17"/>
+    <p:sldId id="315" r:id="rId18"/>
+    <p:sldId id="306" r:id="rId19"/>
+    <p:sldId id="305" r:id="rId20"/>
+    <p:sldId id="270" r:id="rId21"/>
+    <p:sldId id="313" r:id="rId22"/>
+    <p:sldId id="312" r:id="rId23"/>
   </p:sldIdLst>
   <p:sldSz cx="9906000" cy="6858000" type="A4"/>
   <p:notesSz cx="6797675" cy="9928225"/>
@@ -130,6 +131,7 @@
         <p14:section name="Welcome to ScaleIT" id="{7E56C192-0EAF-4A25-A71D-75E239532A4A}">
           <p14:sldIdLst>
             <p14:sldId id="319"/>
+            <p14:sldId id="330"/>
             <p14:sldId id="318"/>
           </p14:sldIdLst>
         </p14:section>
@@ -188,7 +190,7 @@
 <file path=ppt/charts/chart1.xml><?xml version="1.0" encoding="utf-8"?>
 <c:chartSpace xmlns:c="http://schemas.openxmlformats.org/drawingml/2006/chart" xmlns:a="http://schemas.openxmlformats.org/drawingml/2006/main" xmlns:r="http://schemas.openxmlformats.org/officeDocument/2006/relationships" xmlns:c16r2="http://schemas.microsoft.com/office/drawing/2015/06/chart">
   <c:date1904 val="0"/>
-  <c:lang val="de-DE"/>
+  <c:lang val="en-US"/>
   <c:roundedCorners val="0"/>
   <mc:AlternateContent xmlns:mc="http://schemas.openxmlformats.org/markup-compatibility/2006">
     <mc:Choice xmlns:c14="http://schemas.microsoft.com/office/drawing/2007/8/2/chart" Requires="c14">
@@ -506,7 +508,7 @@
 <file path=ppt/charts/chart2.xml><?xml version="1.0" encoding="utf-8"?>
 <c:chartSpace xmlns:c="http://schemas.openxmlformats.org/drawingml/2006/chart" xmlns:a="http://schemas.openxmlformats.org/drawingml/2006/main" xmlns:r="http://schemas.openxmlformats.org/officeDocument/2006/relationships" xmlns:c16r2="http://schemas.microsoft.com/office/drawing/2015/06/chart">
   <c:date1904 val="0"/>
-  <c:lang val="de-DE"/>
+  <c:lang val="en-US"/>
   <c:roundedCorners val="0"/>
   <mc:AlternateContent xmlns:mc="http://schemas.openxmlformats.org/markup-compatibility/2006">
     <mc:Choice xmlns:c14="http://schemas.microsoft.com/office/drawing/2007/8/2/chart" Requires="c14">
@@ -750,7 +752,7 @@
 <file path=ppt/charts/chart3.xml><?xml version="1.0" encoding="utf-8"?>
 <c:chartSpace xmlns:c="http://schemas.openxmlformats.org/drawingml/2006/chart" xmlns:a="http://schemas.openxmlformats.org/drawingml/2006/main" xmlns:r="http://schemas.openxmlformats.org/officeDocument/2006/relationships" xmlns:c16r2="http://schemas.microsoft.com/office/drawing/2015/06/chart">
   <c:date1904 val="0"/>
-  <c:lang val="de-DE"/>
+  <c:lang val="en-US"/>
   <c:roundedCorners val="0"/>
   <mc:AlternateContent xmlns:mc="http://schemas.openxmlformats.org/markup-compatibility/2006">
     <mc:Choice xmlns:c14="http://schemas.microsoft.com/office/drawing/2007/8/2/chart" Requires="c14">
@@ -1114,7 +1116,7 @@
 <file path=ppt/charts/chart4.xml><?xml version="1.0" encoding="utf-8"?>
 <c:chartSpace xmlns:c="http://schemas.openxmlformats.org/drawingml/2006/chart" xmlns:a="http://schemas.openxmlformats.org/drawingml/2006/main" xmlns:r="http://schemas.openxmlformats.org/officeDocument/2006/relationships" xmlns:c16r2="http://schemas.microsoft.com/office/drawing/2015/06/chart">
   <c:date1904 val="0"/>
-  <c:lang val="de-DE"/>
+  <c:lang val="en-US"/>
   <c:roundedCorners val="0"/>
   <mc:AlternateContent xmlns:mc="http://schemas.openxmlformats.org/markup-compatibility/2006">
     <mc:Choice xmlns:c14="http://schemas.microsoft.com/office/drawing/2007/8/2/chart" Requires="c14">
@@ -1524,7 +1526,7 @@
 <file path=ppt/charts/chart5.xml><?xml version="1.0" encoding="utf-8"?>
 <c:chartSpace xmlns:c="http://schemas.openxmlformats.org/drawingml/2006/chart" xmlns:a="http://schemas.openxmlformats.org/drawingml/2006/main" xmlns:r="http://schemas.openxmlformats.org/officeDocument/2006/relationships" xmlns:c16r2="http://schemas.microsoft.com/office/drawing/2015/06/chart">
   <c:date1904 val="0"/>
-  <c:lang val="de-DE"/>
+  <c:lang val="en-US"/>
   <c:roundedCorners val="0"/>
   <mc:AlternateContent xmlns:mc="http://schemas.openxmlformats.org/markup-compatibility/2006">
     <mc:Choice xmlns:c14="http://schemas.microsoft.com/office/drawing/2007/8/2/chart" Requires="c14">
@@ -4783,7 +4785,7 @@
           <a:p>
             <a:fld id="{6CFF613B-2A9F-46DD-9629-249B4C8727B5}" type="datetimeFigureOut">
               <a:rPr lang="de-DE" smtClean="0"/>
-              <a:t>22.01.2018</a:t>
+              <a:t>22.01.18</a:t>
             </a:fld>
             <a:endParaRPr lang="de-DE"/>
           </a:p>
@@ -4825,7 +4827,7 @@
           <a:p>
             <a:fld id="{A6C91B35-01A3-46C0-859F-B4A4203A0F90}" type="slidenum">
               <a:rPr lang="de-DE" smtClean="0"/>
-              <a:t>‹Nr.›</a:t>
+              <a:t>‹#›</a:t>
             </a:fld>
             <a:endParaRPr lang="de-DE"/>
           </a:p>
@@ -4953,7 +4955,7 @@
           <a:p>
             <a:fld id="{6CFF613B-2A9F-46DD-9629-249B4C8727B5}" type="datetimeFigureOut">
               <a:rPr lang="de-DE" smtClean="0"/>
-              <a:t>22.01.2018</a:t>
+              <a:t>22.01.18</a:t>
             </a:fld>
             <a:endParaRPr lang="de-DE"/>
           </a:p>
@@ -4995,7 +4997,7 @@
           <a:p>
             <a:fld id="{A6C91B35-01A3-46C0-859F-B4A4203A0F90}" type="slidenum">
               <a:rPr lang="de-DE" smtClean="0"/>
-              <a:t>‹Nr.›</a:t>
+              <a:t>‹#›</a:t>
             </a:fld>
             <a:endParaRPr lang="de-DE"/>
           </a:p>
@@ -5133,7 +5135,7 @@
           <a:p>
             <a:fld id="{6CFF613B-2A9F-46DD-9629-249B4C8727B5}" type="datetimeFigureOut">
               <a:rPr lang="de-DE" smtClean="0"/>
-              <a:t>22.01.2018</a:t>
+              <a:t>22.01.18</a:t>
             </a:fld>
             <a:endParaRPr lang="de-DE"/>
           </a:p>
@@ -5175,7 +5177,7 @@
           <a:p>
             <a:fld id="{A6C91B35-01A3-46C0-859F-B4A4203A0F90}" type="slidenum">
               <a:rPr lang="de-DE" smtClean="0"/>
-              <a:t>‹Nr.›</a:t>
+              <a:t>‹#›</a:t>
             </a:fld>
             <a:endParaRPr lang="de-DE"/>
           </a:p>
@@ -5680,7 +5682,7 @@
             <a:fld id="{D8D877B3-D348-4611-9BDB-C5374591D951}" type="slidenum">
               <a:rPr lang="en-US" smtClean="0"/>
               <a:pPr/>
-              <a:t>‹Nr.›</a:t>
+              <a:t>‹#›</a:t>
             </a:fld>
             <a:endParaRPr lang="en-US" dirty="0"/>
           </a:p>
@@ -5957,7 +5959,7 @@
           <a:p>
             <a:fld id="{6CFF613B-2A9F-46DD-9629-249B4C8727B5}" type="datetimeFigureOut">
               <a:rPr lang="de-DE" smtClean="0"/>
-              <a:t>22.01.2018</a:t>
+              <a:t>22.01.18</a:t>
             </a:fld>
             <a:endParaRPr lang="de-DE"/>
           </a:p>
@@ -5999,7 +6001,7 @@
           <a:p>
             <a:fld id="{A6C91B35-01A3-46C0-859F-B4A4203A0F90}" type="slidenum">
               <a:rPr lang="de-DE" smtClean="0"/>
-              <a:t>‹Nr.›</a:t>
+              <a:t>‹#›</a:t>
             </a:fld>
             <a:endParaRPr lang="de-DE"/>
           </a:p>
@@ -6201,7 +6203,7 @@
           <a:p>
             <a:fld id="{6CFF613B-2A9F-46DD-9629-249B4C8727B5}" type="datetimeFigureOut">
               <a:rPr lang="de-DE" smtClean="0"/>
-              <a:t>22.01.2018</a:t>
+              <a:t>22.01.18</a:t>
             </a:fld>
             <a:endParaRPr lang="de-DE"/>
           </a:p>
@@ -6243,7 +6245,7 @@
           <a:p>
             <a:fld id="{A6C91B35-01A3-46C0-859F-B4A4203A0F90}" type="slidenum">
               <a:rPr lang="de-DE" smtClean="0"/>
-              <a:t>‹Nr.›</a:t>
+              <a:t>‹#›</a:t>
             </a:fld>
             <a:endParaRPr lang="de-DE"/>
           </a:p>
@@ -6433,7 +6435,7 @@
           <a:p>
             <a:fld id="{6CFF613B-2A9F-46DD-9629-249B4C8727B5}" type="datetimeFigureOut">
               <a:rPr lang="de-DE" smtClean="0"/>
-              <a:t>22.01.2018</a:t>
+              <a:t>22.01.18</a:t>
             </a:fld>
             <a:endParaRPr lang="de-DE"/>
           </a:p>
@@ -6475,7 +6477,7 @@
           <a:p>
             <a:fld id="{A6C91B35-01A3-46C0-859F-B4A4203A0F90}" type="slidenum">
               <a:rPr lang="de-DE" smtClean="0"/>
-              <a:t>‹Nr.›</a:t>
+              <a:t>‹#›</a:t>
             </a:fld>
             <a:endParaRPr lang="de-DE"/>
           </a:p>
@@ -6800,7 +6802,7 @@
           <a:p>
             <a:fld id="{6CFF613B-2A9F-46DD-9629-249B4C8727B5}" type="datetimeFigureOut">
               <a:rPr lang="de-DE" smtClean="0"/>
-              <a:t>22.01.2018</a:t>
+              <a:t>22.01.18</a:t>
             </a:fld>
             <a:endParaRPr lang="de-DE"/>
           </a:p>
@@ -6842,7 +6844,7 @@
           <a:p>
             <a:fld id="{A6C91B35-01A3-46C0-859F-B4A4203A0F90}" type="slidenum">
               <a:rPr lang="de-DE" smtClean="0"/>
-              <a:t>‹Nr.›</a:t>
+              <a:t>‹#›</a:t>
             </a:fld>
             <a:endParaRPr lang="de-DE"/>
           </a:p>
@@ -6918,7 +6920,7 @@
           <a:p>
             <a:fld id="{6CFF613B-2A9F-46DD-9629-249B4C8727B5}" type="datetimeFigureOut">
               <a:rPr lang="de-DE" smtClean="0"/>
-              <a:t>22.01.2018</a:t>
+              <a:t>22.01.18</a:t>
             </a:fld>
             <a:endParaRPr lang="de-DE"/>
           </a:p>
@@ -6960,7 +6962,7 @@
           <a:p>
             <a:fld id="{A6C91B35-01A3-46C0-859F-B4A4203A0F90}" type="slidenum">
               <a:rPr lang="de-DE" smtClean="0"/>
-              <a:t>‹Nr.›</a:t>
+              <a:t>‹#›</a:t>
             </a:fld>
             <a:endParaRPr lang="de-DE"/>
           </a:p>
@@ -7013,7 +7015,7 @@
           <a:p>
             <a:fld id="{6CFF613B-2A9F-46DD-9629-249B4C8727B5}" type="datetimeFigureOut">
               <a:rPr lang="de-DE" smtClean="0"/>
-              <a:t>22.01.2018</a:t>
+              <a:t>22.01.18</a:t>
             </a:fld>
             <a:endParaRPr lang="de-DE"/>
           </a:p>
@@ -7055,7 +7057,7 @@
           <a:p>
             <a:fld id="{A6C91B35-01A3-46C0-859F-B4A4203A0F90}" type="slidenum">
               <a:rPr lang="de-DE" smtClean="0"/>
-              <a:t>‹Nr.›</a:t>
+              <a:t>‹#›</a:t>
             </a:fld>
             <a:endParaRPr lang="de-DE"/>
           </a:p>
@@ -7290,7 +7292,7 @@
           <a:p>
             <a:fld id="{6CFF613B-2A9F-46DD-9629-249B4C8727B5}" type="datetimeFigureOut">
               <a:rPr lang="de-DE" smtClean="0"/>
-              <a:t>22.01.2018</a:t>
+              <a:t>22.01.18</a:t>
             </a:fld>
             <a:endParaRPr lang="de-DE"/>
           </a:p>
@@ -7332,7 +7334,7 @@
           <a:p>
             <a:fld id="{A6C91B35-01A3-46C0-859F-B4A4203A0F90}" type="slidenum">
               <a:rPr lang="de-DE" smtClean="0"/>
-              <a:t>‹Nr.›</a:t>
+              <a:t>‹#›</a:t>
             </a:fld>
             <a:endParaRPr lang="de-DE"/>
           </a:p>
@@ -7547,7 +7549,7 @@
           <a:p>
             <a:fld id="{6CFF613B-2A9F-46DD-9629-249B4C8727B5}" type="datetimeFigureOut">
               <a:rPr lang="de-DE" smtClean="0"/>
-              <a:t>22.01.2018</a:t>
+              <a:t>22.01.18</a:t>
             </a:fld>
             <a:endParaRPr lang="de-DE"/>
           </a:p>
@@ -7589,7 +7591,7 @@
           <a:p>
             <a:fld id="{A6C91B35-01A3-46C0-859F-B4A4203A0F90}" type="slidenum">
               <a:rPr lang="de-DE" smtClean="0"/>
-              <a:t>‹Nr.›</a:t>
+              <a:t>‹#›</a:t>
             </a:fld>
             <a:endParaRPr lang="de-DE"/>
           </a:p>
@@ -7760,7 +7762,7 @@
           <a:p>
             <a:fld id="{6CFF613B-2A9F-46DD-9629-249B4C8727B5}" type="datetimeFigureOut">
               <a:rPr lang="de-DE" smtClean="0"/>
-              <a:t>22.01.2018</a:t>
+              <a:t>22.01.18</a:t>
             </a:fld>
             <a:endParaRPr lang="de-DE"/>
           </a:p>
@@ -7838,7 +7840,7 @@
           <a:p>
             <a:fld id="{A6C91B35-01A3-46C0-859F-B4A4203A0F90}" type="slidenum">
               <a:rPr lang="de-DE" smtClean="0"/>
-              <a:t>‹Nr.›</a:t>
+              <a:t>‹#›</a:t>
             </a:fld>
             <a:endParaRPr lang="de-DE"/>
           </a:p>
@@ -8889,6 +8891,397 @@
     </p:spTree>
     <p:extLst>
       <p:ext uri="{BB962C8B-B14F-4D97-AF65-F5344CB8AC3E}">
+        <p14:creationId xmlns:p14="http://schemas.microsoft.com/office/powerpoint/2010/main" val="3777763640"/>
+      </p:ext>
+    </p:extLst>
+  </p:cSld>
+  <p:clrMapOvr>
+    <a:masterClrMapping/>
+  </p:clrMapOvr>
+</p:sld>
+</file>
+
+<file path=ppt/slides/slide11.xml><?xml version="1.0" encoding="utf-8"?>
+<p:sld xmlns:a="http://schemas.openxmlformats.org/drawingml/2006/main" xmlns:r="http://schemas.openxmlformats.org/officeDocument/2006/relationships" xmlns:p="http://schemas.openxmlformats.org/presentationml/2006/main">
+  <p:cSld>
+    <p:spTree>
+      <p:nvGrpSpPr>
+        <p:cNvPr id="1" name=""/>
+        <p:cNvGrpSpPr/>
+        <p:nvPr/>
+      </p:nvGrpSpPr>
+      <p:grpSpPr>
+        <a:xfrm>
+          <a:off x="0" y="0"/>
+          <a:ext cx="0" cy="0"/>
+          <a:chOff x="0" y="0"/>
+          <a:chExt cx="0" cy="0"/>
+        </a:xfrm>
+      </p:grpSpPr>
+      <p:grpSp>
+        <p:nvGrpSpPr>
+          <p:cNvPr id="3" name="Gruppieren 2">
+            <a:extLst>
+              <a:ext uri="{FF2B5EF4-FFF2-40B4-BE49-F238E27FC236}">
+                <a16:creationId xmlns:a16="http://schemas.microsoft.com/office/drawing/2014/main" id="{FC53B0ED-9C6A-4AC2-981D-6AD57E3B6C8D}"/>
+              </a:ext>
+            </a:extLst>
+          </p:cNvPr>
+          <p:cNvGrpSpPr/>
+          <p:nvPr/>
+        </p:nvGrpSpPr>
+        <p:grpSpPr>
+          <a:xfrm>
+            <a:off x="-298176" y="-1524000"/>
+            <a:ext cx="10707756" cy="9892747"/>
+            <a:chOff x="846936" y="205366"/>
+            <a:chExt cx="5645485" cy="5645485"/>
+          </a:xfrm>
+        </p:grpSpPr>
+        <p:pic>
+          <p:nvPicPr>
+            <p:cNvPr id="8" name="Grafik 7" descr="Tablet">
+              <a:extLst>
+                <a:ext uri="{FF2B5EF4-FFF2-40B4-BE49-F238E27FC236}">
+                  <a16:creationId xmlns:a16="http://schemas.microsoft.com/office/drawing/2014/main" id="{2488CA38-3AC8-4185-B7CF-5C53D516A786}"/>
+                </a:ext>
+              </a:extLst>
+            </p:cNvPr>
+            <p:cNvPicPr>
+              <a:picLocks noChangeAspect="1"/>
+            </p:cNvPicPr>
+            <p:nvPr/>
+          </p:nvPicPr>
+          <p:blipFill>
+            <a:blip r:embed="rId2">
+              <a:extLst>
+                <a:ext uri="{28A0092B-C50C-407E-A947-70E740481C1C}">
+                  <a14:useLocalDpi xmlns:a14="http://schemas.microsoft.com/office/drawing/2010/main" val="0"/>
+                </a:ext>
+                <a:ext uri="{96DAC541-7B7A-43D3-8B79-37D633B846F1}">
+                  <asvg:svgBlip xmlns:asvg="http://schemas.microsoft.com/office/drawing/2016/SVG/main" r:embed="rId3"/>
+                </a:ext>
+              </a:extLst>
+            </a:blip>
+            <a:stretch>
+              <a:fillRect/>
+            </a:stretch>
+          </p:blipFill>
+          <p:spPr>
+            <a:xfrm>
+              <a:off x="846936" y="205366"/>
+              <a:ext cx="5645485" cy="5645485"/>
+            </a:xfrm>
+            <a:prstGeom prst="rect">
+              <a:avLst/>
+            </a:prstGeom>
+          </p:spPr>
+        </p:pic>
+        <p:pic>
+          <p:nvPicPr>
+            <p:cNvPr id="9" name="Inhaltsplatzhalter 3" title="ScaleIT_Logo">
+              <a:extLst>
+                <a:ext uri="{FF2B5EF4-FFF2-40B4-BE49-F238E27FC236}">
+                  <a16:creationId xmlns:a16="http://schemas.microsoft.com/office/drawing/2014/main" id="{55D8DB2A-C0E2-4BD1-AC21-EE1BF356B939}"/>
+                </a:ext>
+              </a:extLst>
+            </p:cNvPr>
+            <p:cNvPicPr>
+              <a:picLocks/>
+            </p:cNvPicPr>
+            <p:nvPr/>
+          </p:nvPicPr>
+          <p:blipFill>
+            <a:blip r:embed="rId4">
+              <a:extLst>
+                <a:ext uri="{28A0092B-C50C-407E-A947-70E740481C1C}">
+                  <a14:useLocalDpi xmlns:a14="http://schemas.microsoft.com/office/drawing/2010/main" val="0"/>
+                </a:ext>
+              </a:extLst>
+            </a:blip>
+            <a:stretch>
+              <a:fillRect/>
+            </a:stretch>
+          </p:blipFill>
+          <p:spPr>
+            <a:xfrm>
+              <a:off x="5377998" y="4491474"/>
+              <a:ext cx="477550" cy="138017"/>
+            </a:xfrm>
+            <a:prstGeom prst="rect">
+              <a:avLst/>
+            </a:prstGeom>
+          </p:spPr>
+        </p:pic>
+      </p:grpSp>
+      <p:sp>
+        <p:nvSpPr>
+          <p:cNvPr id="10" name="Rechteck 9">
+            <a:extLst>
+              <a:ext uri="{FF2B5EF4-FFF2-40B4-BE49-F238E27FC236}">
+                <a16:creationId xmlns:a16="http://schemas.microsoft.com/office/drawing/2014/main" id="{4680C422-D169-4A66-B99B-8E6887C84B4F}"/>
+              </a:ext>
+            </a:extLst>
+          </p:cNvPr>
+          <p:cNvSpPr/>
+          <p:nvPr/>
+        </p:nvSpPr>
+        <p:spPr>
+          <a:xfrm>
+            <a:off x="801756" y="715618"/>
+            <a:ext cx="8479382" cy="5221356"/>
+          </a:xfrm>
+          <a:prstGeom prst="rect">
+            <a:avLst/>
+          </a:prstGeom>
+          <a:ln>
+            <a:solidFill>
+              <a:schemeClr val="tx1"/>
+            </a:solidFill>
+          </a:ln>
+        </p:spPr>
+        <p:style>
+          <a:lnRef idx="2">
+            <a:schemeClr val="accent6"/>
+          </a:lnRef>
+          <a:fillRef idx="1">
+            <a:schemeClr val="lt1"/>
+          </a:fillRef>
+          <a:effectRef idx="0">
+            <a:schemeClr val="accent6"/>
+          </a:effectRef>
+          <a:fontRef idx="minor">
+            <a:schemeClr val="dk1"/>
+          </a:fontRef>
+        </p:style>
+        <p:txBody>
+          <a:bodyPr rtlCol="0" anchor="ctr"/>
+          <a:lstStyle/>
+          <a:p>
+            <a:pPr algn="ctr"/>
+            <a:endParaRPr lang="de-DE"/>
+          </a:p>
+        </p:txBody>
+      </p:sp>
+      <p:sp>
+        <p:nvSpPr>
+          <p:cNvPr id="12" name="Rechteck 11">
+            <a:extLst>
+              <a:ext uri="{FF2B5EF4-FFF2-40B4-BE49-F238E27FC236}">
+                <a16:creationId xmlns:a16="http://schemas.microsoft.com/office/drawing/2014/main" id="{DBD22CEB-E33F-4E4B-9213-AEF84E86B40A}"/>
+              </a:ext>
+            </a:extLst>
+          </p:cNvPr>
+          <p:cNvSpPr/>
+          <p:nvPr/>
+        </p:nvSpPr>
+        <p:spPr>
+          <a:xfrm>
+            <a:off x="3922643" y="5943600"/>
+            <a:ext cx="2199861" cy="218661"/>
+          </a:xfrm>
+          <a:prstGeom prst="rect">
+            <a:avLst/>
+          </a:prstGeom>
+          <a:solidFill>
+            <a:schemeClr val="tx1"/>
+          </a:solidFill>
+          <a:ln>
+            <a:solidFill>
+              <a:schemeClr val="tx1"/>
+            </a:solidFill>
+          </a:ln>
+        </p:spPr>
+        <p:style>
+          <a:lnRef idx="2">
+            <a:schemeClr val="accent1">
+              <a:shade val="50000"/>
+            </a:schemeClr>
+          </a:lnRef>
+          <a:fillRef idx="1">
+            <a:schemeClr val="accent1"/>
+          </a:fillRef>
+          <a:effectRef idx="0">
+            <a:schemeClr val="accent1"/>
+          </a:effectRef>
+          <a:fontRef idx="minor">
+            <a:schemeClr val="lt1"/>
+          </a:fontRef>
+        </p:style>
+        <p:txBody>
+          <a:bodyPr rtlCol="0" anchor="ctr"/>
+          <a:lstStyle/>
+          <a:p>
+            <a:pPr algn="ctr"/>
+            <a:endParaRPr lang="de-DE"/>
+          </a:p>
+        </p:txBody>
+      </p:sp>
+      <p:sp>
+        <p:nvSpPr>
+          <p:cNvPr id="13" name="Ellipse 12">
+            <a:extLst>
+              <a:ext uri="{FF2B5EF4-FFF2-40B4-BE49-F238E27FC236}">
+                <a16:creationId xmlns:a16="http://schemas.microsoft.com/office/drawing/2014/main" id="{23E50D8B-64CE-4B16-A213-5B1B26C52A5F}"/>
+              </a:ext>
+            </a:extLst>
+          </p:cNvPr>
+          <p:cNvSpPr/>
+          <p:nvPr/>
+        </p:nvSpPr>
+        <p:spPr>
+          <a:xfrm>
+            <a:off x="4938742" y="6026425"/>
+            <a:ext cx="205409" cy="205409"/>
+          </a:xfrm>
+          <a:prstGeom prst="ellipse">
+            <a:avLst/>
+          </a:prstGeom>
+          <a:solidFill>
+            <a:schemeClr val="bg1"/>
+          </a:solidFill>
+          <a:ln>
+            <a:solidFill>
+              <a:schemeClr val="tx1"/>
+            </a:solidFill>
+          </a:ln>
+        </p:spPr>
+        <p:style>
+          <a:lnRef idx="2">
+            <a:schemeClr val="accent1">
+              <a:shade val="50000"/>
+            </a:schemeClr>
+          </a:lnRef>
+          <a:fillRef idx="1">
+            <a:schemeClr val="accent1"/>
+          </a:fillRef>
+          <a:effectRef idx="0">
+            <a:schemeClr val="accent1"/>
+          </a:effectRef>
+          <a:fontRef idx="minor">
+            <a:schemeClr val="lt1"/>
+          </a:fontRef>
+        </p:style>
+        <p:txBody>
+          <a:bodyPr rtlCol="0" anchor="ctr"/>
+          <a:lstStyle/>
+          <a:p>
+            <a:pPr algn="ctr"/>
+            <a:endParaRPr lang="de-DE"/>
+          </a:p>
+        </p:txBody>
+      </p:sp>
+      <p:pic>
+        <p:nvPicPr>
+          <p:cNvPr id="14" name="Grafik 13">
+            <a:extLst>
+              <a:ext uri="{FF2B5EF4-FFF2-40B4-BE49-F238E27FC236}">
+                <a16:creationId xmlns:a16="http://schemas.microsoft.com/office/drawing/2014/main" id="{454CF4C6-0464-41E3-90AE-891BF851BFA7}"/>
+              </a:ext>
+            </a:extLst>
+          </p:cNvPr>
+          <p:cNvPicPr>
+            <a:picLocks noChangeAspect="1"/>
+          </p:cNvPicPr>
+          <p:nvPr/>
+        </p:nvPicPr>
+        <p:blipFill>
+          <a:blip r:embed="rId5">
+            <a:extLst>
+              <a:ext uri="{28A0092B-C50C-407E-A947-70E740481C1C}">
+                <a14:useLocalDpi xmlns:a14="http://schemas.microsoft.com/office/drawing/2010/main" val="0"/>
+              </a:ext>
+            </a:extLst>
+          </a:blip>
+          <a:stretch>
+            <a:fillRect/>
+          </a:stretch>
+        </p:blipFill>
+        <p:spPr>
+          <a:xfrm>
+            <a:off x="876939" y="754462"/>
+            <a:ext cx="257628" cy="238019"/>
+          </a:xfrm>
+          <a:prstGeom prst="rect">
+            <a:avLst/>
+          </a:prstGeom>
+        </p:spPr>
+      </p:pic>
+      <p:pic>
+        <p:nvPicPr>
+          <p:cNvPr id="15" name="Grafik 14">
+            <a:extLst>
+              <a:ext uri="{FF2B5EF4-FFF2-40B4-BE49-F238E27FC236}">
+                <a16:creationId xmlns:a16="http://schemas.microsoft.com/office/drawing/2014/main" id="{D0E52042-E5F0-4DC4-B637-EF6E3FF376D2}"/>
+              </a:ext>
+            </a:extLst>
+          </p:cNvPr>
+          <p:cNvPicPr>
+            <a:picLocks noChangeAspect="1"/>
+          </p:cNvPicPr>
+          <p:nvPr/>
+        </p:nvPicPr>
+        <p:blipFill>
+          <a:blip r:embed="rId6">
+            <a:extLst>
+              <a:ext uri="{28A0092B-C50C-407E-A947-70E740481C1C}">
+                <a14:useLocalDpi xmlns:a14="http://schemas.microsoft.com/office/drawing/2010/main" val="0"/>
+              </a:ext>
+            </a:extLst>
+          </a:blip>
+          <a:stretch>
+            <a:fillRect/>
+          </a:stretch>
+        </p:blipFill>
+        <p:spPr>
+          <a:xfrm rot="16200000">
+            <a:off x="1302752" y="701933"/>
+            <a:ext cx="332210" cy="359579"/>
+          </a:xfrm>
+          <a:prstGeom prst="rect">
+            <a:avLst/>
+          </a:prstGeom>
+        </p:spPr>
+      </p:pic>
+      <p:pic>
+        <p:nvPicPr>
+          <p:cNvPr id="16" name="Grafik 15">
+            <a:extLst>
+              <a:ext uri="{FF2B5EF4-FFF2-40B4-BE49-F238E27FC236}">
+                <a16:creationId xmlns:a16="http://schemas.microsoft.com/office/drawing/2014/main" id="{B2E3FD90-BB71-4CD2-BCE6-85F6BFCDB57D}"/>
+              </a:ext>
+            </a:extLst>
+          </p:cNvPr>
+          <p:cNvPicPr>
+            <a:picLocks noChangeAspect="1"/>
+          </p:cNvPicPr>
+          <p:nvPr/>
+        </p:nvPicPr>
+        <p:blipFill>
+          <a:blip r:embed="rId7">
+            <a:extLst>
+              <a:ext uri="{28A0092B-C50C-407E-A947-70E740481C1C}">
+                <a14:useLocalDpi xmlns:a14="http://schemas.microsoft.com/office/drawing/2010/main" val="0"/>
+              </a:ext>
+            </a:extLst>
+          </a:blip>
+          <a:stretch>
+            <a:fillRect/>
+          </a:stretch>
+        </p:blipFill>
+        <p:spPr>
+          <a:xfrm>
+            <a:off x="1827035" y="758212"/>
+            <a:ext cx="253569" cy="234269"/>
+          </a:xfrm>
+          <a:prstGeom prst="rect">
+            <a:avLst/>
+          </a:prstGeom>
+        </p:spPr>
+      </p:pic>
+    </p:spTree>
+    <p:extLst>
+      <p:ext uri="{BB962C8B-B14F-4D97-AF65-F5344CB8AC3E}">
         <p14:creationId xmlns:p14="http://schemas.microsoft.com/office/powerpoint/2010/main" val="2537199465"/>
       </p:ext>
     </p:extLst>
@@ -8899,7 +9292,7 @@
 </p:sld>
 </file>
 
-<file path=ppt/slides/slide11.xml><?xml version="1.0" encoding="utf-8"?>
+<file path=ppt/slides/slide12.xml><?xml version="1.0" encoding="utf-8"?>
 <p:sld xmlns:a="http://schemas.openxmlformats.org/drawingml/2006/main" xmlns:r="http://schemas.openxmlformats.org/officeDocument/2006/relationships" xmlns:p="http://schemas.openxmlformats.org/presentationml/2006/main">
   <p:cSld>
     <p:spTree>
@@ -9095,7 +9488,7 @@
 </p:sld>
 </file>
 
-<file path=ppt/slides/slide12.xml><?xml version="1.0" encoding="utf-8"?>
+<file path=ppt/slides/slide13.xml><?xml version="1.0" encoding="utf-8"?>
 <p:sld xmlns:a="http://schemas.openxmlformats.org/drawingml/2006/main" xmlns:r="http://schemas.openxmlformats.org/officeDocument/2006/relationships" xmlns:p="http://schemas.openxmlformats.org/presentationml/2006/main">
   <p:cSld>
     <p:spTree>
@@ -9291,7 +9684,7 @@
 </p:sld>
 </file>
 
-<file path=ppt/slides/slide13.xml><?xml version="1.0" encoding="utf-8"?>
+<file path=ppt/slides/slide14.xml><?xml version="1.0" encoding="utf-8"?>
 <p:sld xmlns:a="http://schemas.openxmlformats.org/drawingml/2006/main" xmlns:r="http://schemas.openxmlformats.org/officeDocument/2006/relationships" xmlns:p="http://schemas.openxmlformats.org/presentationml/2006/main">
   <p:cSld>
     <p:spTree>
@@ -9967,7 +10360,7 @@
 </p:sld>
 </file>
 
-<file path=ppt/slides/slide14.xml><?xml version="1.0" encoding="utf-8"?>
+<file path=ppt/slides/slide15.xml><?xml version="1.0" encoding="utf-8"?>
 <p:sld xmlns:a="http://schemas.openxmlformats.org/drawingml/2006/main" xmlns:r="http://schemas.openxmlformats.org/officeDocument/2006/relationships" xmlns:p="http://schemas.openxmlformats.org/presentationml/2006/main">
   <p:cSld>
     <p:spTree>
@@ -11003,7 +11396,7 @@
 </p:sld>
 </file>
 
-<file path=ppt/slides/slide15.xml><?xml version="1.0" encoding="utf-8"?>
+<file path=ppt/slides/slide16.xml><?xml version="1.0" encoding="utf-8"?>
 <p:sld xmlns:a="http://schemas.openxmlformats.org/drawingml/2006/main" xmlns:r="http://schemas.openxmlformats.org/officeDocument/2006/relationships" xmlns:p="http://schemas.openxmlformats.org/presentationml/2006/main">
   <p:cSld>
     <p:spTree>
@@ -11268,7 +11661,7 @@
 </p:sld>
 </file>
 
-<file path=ppt/slides/slide16.xml><?xml version="1.0" encoding="utf-8"?>
+<file path=ppt/slides/slide17.xml><?xml version="1.0" encoding="utf-8"?>
 <p:sld xmlns:a="http://schemas.openxmlformats.org/drawingml/2006/main" xmlns:r="http://schemas.openxmlformats.org/officeDocument/2006/relationships" xmlns:p="http://schemas.openxmlformats.org/presentationml/2006/main">
   <p:cSld>
     <p:spTree>
@@ -11533,7 +11926,7 @@
 </p:sld>
 </file>
 
-<file path=ppt/slides/slide17.xml><?xml version="1.0" encoding="utf-8"?>
+<file path=ppt/slides/slide18.xml><?xml version="1.0" encoding="utf-8"?>
 <p:sld xmlns:a="http://schemas.openxmlformats.org/drawingml/2006/main" xmlns:r="http://schemas.openxmlformats.org/officeDocument/2006/relationships" xmlns:p="http://schemas.openxmlformats.org/presentationml/2006/main">
   <p:cSld>
     <p:spTree>
@@ -12593,7 +12986,7 @@
 </p:sld>
 </file>
 
-<file path=ppt/slides/slide18.xml><?xml version="1.0" encoding="utf-8"?>
+<file path=ppt/slides/slide19.xml><?xml version="1.0" encoding="utf-8"?>
 <p:sld xmlns:a="http://schemas.openxmlformats.org/drawingml/2006/main" xmlns:r="http://schemas.openxmlformats.org/officeDocument/2006/relationships" xmlns:p="http://schemas.openxmlformats.org/presentationml/2006/main">
   <p:cSld>
     <p:spTree>
@@ -13299,7 +13692,448 @@
 </p:sld>
 </file>
 
-<file path=ppt/slides/slide19.xml><?xml version="1.0" encoding="utf-8"?>
+<file path=ppt/slides/slide2.xml><?xml version="1.0" encoding="utf-8"?>
+<p:sld xmlns:a="http://schemas.openxmlformats.org/drawingml/2006/main" xmlns:r="http://schemas.openxmlformats.org/officeDocument/2006/relationships" xmlns:p="http://schemas.openxmlformats.org/presentationml/2006/main">
+  <p:cSld>
+    <p:spTree>
+      <p:nvGrpSpPr>
+        <p:cNvPr id="1" name=""/>
+        <p:cNvGrpSpPr/>
+        <p:nvPr/>
+      </p:nvGrpSpPr>
+      <p:grpSpPr>
+        <a:xfrm>
+          <a:off x="0" y="0"/>
+          <a:ext cx="0" cy="0"/>
+          <a:chOff x="0" y="0"/>
+          <a:chExt cx="0" cy="0"/>
+        </a:xfrm>
+      </p:grpSpPr>
+      <p:pic>
+        <p:nvPicPr>
+          <p:cNvPr id="4" name="Picture 3">
+            <a:extLst>
+              <a:ext uri="{FF2B5EF4-FFF2-40B4-BE49-F238E27FC236}">
+                <a16:creationId xmlns:a16="http://schemas.microsoft.com/office/drawing/2014/main" id="{2B1E01DE-77A1-724F-A458-46A20B7BD845}"/>
+              </a:ext>
+            </a:extLst>
+          </p:cNvPr>
+          <p:cNvPicPr>
+            <a:picLocks noChangeAspect="1"/>
+          </p:cNvPicPr>
+          <p:nvPr/>
+        </p:nvPicPr>
+        <p:blipFill rotWithShape="1">
+          <a:blip r:embed="rId2">
+            <a:extLst>
+              <a:ext uri="{28A0092B-C50C-407E-A947-70E740481C1C}">
+                <a14:useLocalDpi xmlns:a14="http://schemas.microsoft.com/office/drawing/2010/main" val="0"/>
+              </a:ext>
+            </a:extLst>
+          </a:blip>
+          <a:srcRect l="27188" t="39946" r="29219" b="40300"/>
+          <a:stretch/>
+        </p:blipFill>
+        <p:spPr>
+          <a:xfrm>
+            <a:off x="2814022" y="1205852"/>
+            <a:ext cx="3008829" cy="746990"/>
+          </a:xfrm>
+          <a:prstGeom prst="rect">
+            <a:avLst/>
+          </a:prstGeom>
+        </p:spPr>
+      </p:pic>
+      <p:pic>
+        <p:nvPicPr>
+          <p:cNvPr id="1026" name="Picture 2" descr="Image result for seal of approval">
+            <a:extLst>
+              <a:ext uri="{FF2B5EF4-FFF2-40B4-BE49-F238E27FC236}">
+                <a16:creationId xmlns:a16="http://schemas.microsoft.com/office/drawing/2014/main" id="{C3F87EAF-E6DA-1C41-B3C3-15044402262D}"/>
+              </a:ext>
+            </a:extLst>
+          </p:cNvPr>
+          <p:cNvPicPr>
+            <a:picLocks noChangeAspect="1" noChangeArrowheads="1"/>
+          </p:cNvPicPr>
+          <p:nvPr/>
+        </p:nvPicPr>
+        <p:blipFill>
+          <a:blip r:embed="rId3">
+            <a:extLst>
+              <a:ext uri="{28A0092B-C50C-407E-A947-70E740481C1C}">
+                <a14:useLocalDpi xmlns:a14="http://schemas.microsoft.com/office/drawing/2010/main" val="0"/>
+              </a:ext>
+            </a:extLst>
+          </a:blip>
+          <a:srcRect/>
+          <a:stretch>
+            <a:fillRect/>
+          </a:stretch>
+        </p:blipFill>
+        <p:spPr bwMode="auto">
+          <a:xfrm>
+            <a:off x="5822851" y="1060122"/>
+            <a:ext cx="1331346" cy="1038451"/>
+          </a:xfrm>
+          <a:prstGeom prst="rect">
+            <a:avLst/>
+          </a:prstGeom>
+          <a:noFill/>
+          <a:extLst>
+            <a:ext uri="{909E8E84-426E-40DD-AFC4-6F175D3DCCD1}">
+              <a14:hiddenFill xmlns:a14="http://schemas.microsoft.com/office/drawing/2010/main">
+                <a:solidFill>
+                  <a:srgbClr val="FFFFFF"/>
+                </a:solidFill>
+              </a14:hiddenFill>
+            </a:ext>
+          </a:extLst>
+        </p:spPr>
+      </p:pic>
+      <p:pic>
+        <p:nvPicPr>
+          <p:cNvPr id="7" name="Picture 6">
+            <a:extLst>
+              <a:ext uri="{FF2B5EF4-FFF2-40B4-BE49-F238E27FC236}">
+                <a16:creationId xmlns:a16="http://schemas.microsoft.com/office/drawing/2014/main" id="{7D6023BC-94EB-E749-A017-D04376385618}"/>
+              </a:ext>
+            </a:extLst>
+          </p:cNvPr>
+          <p:cNvPicPr>
+            <a:picLocks noChangeAspect="1"/>
+          </p:cNvPicPr>
+          <p:nvPr/>
+        </p:nvPicPr>
+        <p:blipFill rotWithShape="1">
+          <a:blip r:embed="rId2">
+            <a:extLst>
+              <a:ext uri="{28A0092B-C50C-407E-A947-70E740481C1C}">
+                <a14:useLocalDpi xmlns:a14="http://schemas.microsoft.com/office/drawing/2010/main" val="0"/>
+              </a:ext>
+            </a:extLst>
+          </a:blip>
+          <a:srcRect l="27188" t="39946" r="29219" b="40300"/>
+          <a:stretch/>
+        </p:blipFill>
+        <p:spPr>
+          <a:xfrm>
+            <a:off x="2814022" y="2449366"/>
+            <a:ext cx="3008829" cy="746990"/>
+          </a:xfrm>
+          <a:prstGeom prst="rect">
+            <a:avLst/>
+          </a:prstGeom>
+        </p:spPr>
+      </p:pic>
+      <p:pic>
+        <p:nvPicPr>
+          <p:cNvPr id="8" name="Picture 7" descr="Image result for seal of approval">
+            <a:extLst>
+              <a:ext uri="{FF2B5EF4-FFF2-40B4-BE49-F238E27FC236}">
+                <a16:creationId xmlns:a16="http://schemas.microsoft.com/office/drawing/2014/main" id="{F178DBBA-F53E-8444-B102-C57616D8190F}"/>
+              </a:ext>
+            </a:extLst>
+          </p:cNvPr>
+          <p:cNvPicPr>
+            <a:picLocks noChangeAspect="1" noChangeArrowheads="1"/>
+          </p:cNvPicPr>
+          <p:nvPr/>
+        </p:nvPicPr>
+        <p:blipFill>
+          <a:blip r:embed="rId3">
+            <a:extLst>
+              <a:ext uri="{28A0092B-C50C-407E-A947-70E740481C1C}">
+                <a14:useLocalDpi xmlns:a14="http://schemas.microsoft.com/office/drawing/2010/main" val="0"/>
+              </a:ext>
+            </a:extLst>
+          </a:blip>
+          <a:srcRect/>
+          <a:stretch>
+            <a:fillRect/>
+          </a:stretch>
+        </p:blipFill>
+        <p:spPr bwMode="auto">
+          <a:xfrm>
+            <a:off x="5822851" y="2303636"/>
+            <a:ext cx="1331346" cy="1038451"/>
+          </a:xfrm>
+          <a:prstGeom prst="rect">
+            <a:avLst/>
+          </a:prstGeom>
+          <a:noFill/>
+          <a:extLst>
+            <a:ext uri="{909E8E84-426E-40DD-AFC4-6F175D3DCCD1}">
+              <a14:hiddenFill xmlns:a14="http://schemas.microsoft.com/office/drawing/2010/main">
+                <a:solidFill>
+                  <a:srgbClr val="FFFFFF"/>
+                </a:solidFill>
+              </a14:hiddenFill>
+            </a:ext>
+          </a:extLst>
+        </p:spPr>
+      </p:pic>
+      <p:pic>
+        <p:nvPicPr>
+          <p:cNvPr id="9" name="Picture 8">
+            <a:extLst>
+              <a:ext uri="{FF2B5EF4-FFF2-40B4-BE49-F238E27FC236}">
+                <a16:creationId xmlns:a16="http://schemas.microsoft.com/office/drawing/2014/main" id="{D8E508ED-E805-2B45-BF28-7DC3BE20649F}"/>
+              </a:ext>
+            </a:extLst>
+          </p:cNvPr>
+          <p:cNvPicPr>
+            <a:picLocks noChangeAspect="1"/>
+          </p:cNvPicPr>
+          <p:nvPr/>
+        </p:nvPicPr>
+        <p:blipFill rotWithShape="1">
+          <a:blip r:embed="rId2">
+            <a:extLst>
+              <a:ext uri="{28A0092B-C50C-407E-A947-70E740481C1C}">
+                <a14:useLocalDpi xmlns:a14="http://schemas.microsoft.com/office/drawing/2010/main" val="0"/>
+              </a:ext>
+            </a:extLst>
+          </a:blip>
+          <a:srcRect l="27188" t="39946" r="29219" b="40300"/>
+          <a:stretch/>
+        </p:blipFill>
+        <p:spPr>
+          <a:xfrm>
+            <a:off x="2814022" y="3692880"/>
+            <a:ext cx="3008829" cy="746990"/>
+          </a:xfrm>
+          <a:prstGeom prst="rect">
+            <a:avLst/>
+          </a:prstGeom>
+        </p:spPr>
+      </p:pic>
+      <p:pic>
+        <p:nvPicPr>
+          <p:cNvPr id="10" name="Picture 9" descr="Image result for seal of approval">
+            <a:extLst>
+              <a:ext uri="{FF2B5EF4-FFF2-40B4-BE49-F238E27FC236}">
+                <a16:creationId xmlns:a16="http://schemas.microsoft.com/office/drawing/2014/main" id="{A5E7C5A7-A7F2-FF4E-BC0B-DA7A70063FB8}"/>
+              </a:ext>
+            </a:extLst>
+          </p:cNvPr>
+          <p:cNvPicPr>
+            <a:picLocks noChangeAspect="1" noChangeArrowheads="1"/>
+          </p:cNvPicPr>
+          <p:nvPr/>
+        </p:nvPicPr>
+        <p:blipFill>
+          <a:blip r:embed="rId3">
+            <a:extLst>
+              <a:ext uri="{28A0092B-C50C-407E-A947-70E740481C1C}">
+                <a14:useLocalDpi xmlns:a14="http://schemas.microsoft.com/office/drawing/2010/main" val="0"/>
+              </a:ext>
+            </a:extLst>
+          </a:blip>
+          <a:srcRect/>
+          <a:stretch>
+            <a:fillRect/>
+          </a:stretch>
+        </p:blipFill>
+        <p:spPr bwMode="auto">
+          <a:xfrm>
+            <a:off x="5822851" y="3547150"/>
+            <a:ext cx="1331346" cy="1038451"/>
+          </a:xfrm>
+          <a:prstGeom prst="rect">
+            <a:avLst/>
+          </a:prstGeom>
+          <a:noFill/>
+          <a:extLst>
+            <a:ext uri="{909E8E84-426E-40DD-AFC4-6F175D3DCCD1}">
+              <a14:hiddenFill xmlns:a14="http://schemas.microsoft.com/office/drawing/2010/main">
+                <a:solidFill>
+                  <a:srgbClr val="FFFFFF"/>
+                </a:solidFill>
+              </a14:hiddenFill>
+            </a:ext>
+          </a:extLst>
+        </p:spPr>
+      </p:pic>
+      <p:pic>
+        <p:nvPicPr>
+          <p:cNvPr id="11" name="Picture 10">
+            <a:extLst>
+              <a:ext uri="{FF2B5EF4-FFF2-40B4-BE49-F238E27FC236}">
+                <a16:creationId xmlns:a16="http://schemas.microsoft.com/office/drawing/2014/main" id="{594B061E-A2F4-1A41-B038-D2A005FC1AE0}"/>
+              </a:ext>
+            </a:extLst>
+          </p:cNvPr>
+          <p:cNvPicPr>
+            <a:picLocks noChangeAspect="1"/>
+          </p:cNvPicPr>
+          <p:nvPr/>
+        </p:nvPicPr>
+        <p:blipFill rotWithShape="1">
+          <a:blip r:embed="rId2">
+            <a:extLst>
+              <a:ext uri="{28A0092B-C50C-407E-A947-70E740481C1C}">
+                <a14:useLocalDpi xmlns:a14="http://schemas.microsoft.com/office/drawing/2010/main" val="0"/>
+              </a:ext>
+            </a:extLst>
+          </a:blip>
+          <a:srcRect l="27188" t="39946" r="29219" b="40300"/>
+          <a:stretch/>
+        </p:blipFill>
+        <p:spPr>
+          <a:xfrm>
+            <a:off x="2814022" y="4936395"/>
+            <a:ext cx="3008829" cy="746990"/>
+          </a:xfrm>
+          <a:prstGeom prst="rect">
+            <a:avLst/>
+          </a:prstGeom>
+        </p:spPr>
+      </p:pic>
+      <p:pic>
+        <p:nvPicPr>
+          <p:cNvPr id="12" name="Picture 11" descr="Image result for seal of approval">
+            <a:extLst>
+              <a:ext uri="{FF2B5EF4-FFF2-40B4-BE49-F238E27FC236}">
+                <a16:creationId xmlns:a16="http://schemas.microsoft.com/office/drawing/2014/main" id="{A1F92115-8716-374A-A23F-5CAE9FD7A9A6}"/>
+              </a:ext>
+            </a:extLst>
+          </p:cNvPr>
+          <p:cNvPicPr>
+            <a:picLocks noChangeAspect="1" noChangeArrowheads="1"/>
+          </p:cNvPicPr>
+          <p:nvPr/>
+        </p:nvPicPr>
+        <p:blipFill>
+          <a:blip r:embed="rId3">
+            <a:extLst>
+              <a:ext uri="{28A0092B-C50C-407E-A947-70E740481C1C}">
+                <a14:useLocalDpi xmlns:a14="http://schemas.microsoft.com/office/drawing/2010/main" val="0"/>
+              </a:ext>
+            </a:extLst>
+          </a:blip>
+          <a:srcRect/>
+          <a:stretch>
+            <a:fillRect/>
+          </a:stretch>
+        </p:blipFill>
+        <p:spPr bwMode="auto">
+          <a:xfrm>
+            <a:off x="5822851" y="4790664"/>
+            <a:ext cx="1331346" cy="1038451"/>
+          </a:xfrm>
+          <a:prstGeom prst="rect">
+            <a:avLst/>
+          </a:prstGeom>
+          <a:noFill/>
+          <a:extLst>
+            <a:ext uri="{909E8E84-426E-40DD-AFC4-6F175D3DCCD1}">
+              <a14:hiddenFill xmlns:a14="http://schemas.microsoft.com/office/drawing/2010/main">
+                <a:solidFill>
+                  <a:srgbClr val="FFFFFF"/>
+                </a:solidFill>
+              </a14:hiddenFill>
+            </a:ext>
+          </a:extLst>
+        </p:spPr>
+      </p:pic>
+      <p:sp>
+        <p:nvSpPr>
+          <p:cNvPr id="2" name="TextBox 1">
+            <a:extLst>
+              <a:ext uri="{FF2B5EF4-FFF2-40B4-BE49-F238E27FC236}">
+                <a16:creationId xmlns:a16="http://schemas.microsoft.com/office/drawing/2014/main" id="{46D510CF-ACC3-9F40-985B-602A6AEF18EC}"/>
+              </a:ext>
+            </a:extLst>
+          </p:cNvPr>
+          <p:cNvSpPr txBox="1"/>
+          <p:nvPr/>
+        </p:nvSpPr>
+        <p:spPr>
+          <a:xfrm>
+            <a:off x="1854200" y="6581001"/>
+            <a:ext cx="5643404" cy="276999"/>
+          </a:xfrm>
+          <a:prstGeom prst="rect">
+            <a:avLst/>
+          </a:prstGeom>
+          <a:noFill/>
+        </p:spPr>
+        <p:txBody>
+          <a:bodyPr wrap="none" rtlCol="0">
+            <a:spAutoFit/>
+          </a:bodyPr>
+          <a:lstStyle/>
+          <a:p>
+            <a:r>
+              <a:rPr lang="de-DE" sz="1200" dirty="0"/>
+              <a:t>https://</a:t>
+            </a:r>
+            <a:r>
+              <a:rPr lang="de-DE" sz="1200" dirty="0" err="1"/>
+              <a:t>www.westfield.in.gov</a:t>
+            </a:r>
+            <a:r>
+              <a:rPr lang="de-DE" sz="1200" dirty="0"/>
+              <a:t>/</a:t>
+            </a:r>
+            <a:r>
+              <a:rPr lang="de-DE" sz="1200" dirty="0" err="1"/>
+              <a:t>egov</a:t>
+            </a:r>
+            <a:r>
+              <a:rPr lang="de-DE" sz="1200" dirty="0"/>
+              <a:t>/</a:t>
+            </a:r>
+            <a:r>
+              <a:rPr lang="de-DE" sz="1200" dirty="0" err="1"/>
+              <a:t>apps</a:t>
+            </a:r>
+            <a:r>
+              <a:rPr lang="de-DE" sz="1200" dirty="0"/>
+              <a:t>/</a:t>
+            </a:r>
+            <a:r>
+              <a:rPr lang="de-DE" sz="1200" dirty="0" err="1"/>
+              <a:t>action</a:t>
+            </a:r>
+            <a:r>
+              <a:rPr lang="de-DE" sz="1200" dirty="0"/>
+              <a:t>/</a:t>
+            </a:r>
+            <a:r>
+              <a:rPr lang="de-DE" sz="1200" dirty="0" err="1"/>
+              <a:t>center.egov?view</a:t>
+            </a:r>
+            <a:r>
+              <a:rPr lang="de-DE" sz="1200" dirty="0"/>
+              <a:t>=</a:t>
+            </a:r>
+            <a:r>
+              <a:rPr lang="de-DE" sz="1200" dirty="0" err="1"/>
+              <a:t>form;page</a:t>
+            </a:r>
+            <a:r>
+              <a:rPr lang="de-DE" sz="1200" dirty="0"/>
+              <a:t>=1;id=404</a:t>
+            </a:r>
+          </a:p>
+        </p:txBody>
+      </p:sp>
+    </p:spTree>
+    <p:extLst>
+      <p:ext uri="{BB962C8B-B14F-4D97-AF65-F5344CB8AC3E}">
+        <p14:creationId xmlns:p14="http://schemas.microsoft.com/office/powerpoint/2010/main" val="2645605"/>
+      </p:ext>
+    </p:extLst>
+  </p:cSld>
+  <p:clrMapOvr>
+    <a:masterClrMapping/>
+  </p:clrMapOvr>
+</p:sld>
+</file>
+
+<file path=ppt/slides/slide20.xml><?xml version="1.0" encoding="utf-8"?>
 <p:sld xmlns:a="http://schemas.openxmlformats.org/drawingml/2006/main" xmlns:r="http://schemas.openxmlformats.org/officeDocument/2006/relationships" xmlns:p="http://schemas.openxmlformats.org/presentationml/2006/main">
   <p:cSld>
     <p:spTree>
@@ -13479,120 +14313,7 @@
 </p:sld>
 </file>
 
-<file path=ppt/slides/slide2.xml><?xml version="1.0" encoding="utf-8"?>
-<p:sld xmlns:a="http://schemas.openxmlformats.org/drawingml/2006/main" xmlns:r="http://schemas.openxmlformats.org/officeDocument/2006/relationships" xmlns:p="http://schemas.openxmlformats.org/presentationml/2006/main">
-  <p:cSld>
-    <p:spTree>
-      <p:nvGrpSpPr>
-        <p:cNvPr id="1" name=""/>
-        <p:cNvGrpSpPr/>
-        <p:nvPr/>
-      </p:nvGrpSpPr>
-      <p:grpSpPr>
-        <a:xfrm>
-          <a:off x="0" y="0"/>
-          <a:ext cx="0" cy="0"/>
-          <a:chOff x="0" y="0"/>
-          <a:chExt cx="0" cy="0"/>
-        </a:xfrm>
-      </p:grpSpPr>
-      <p:pic>
-        <p:nvPicPr>
-          <p:cNvPr id="2" name="Picture 6" descr="StickyJotseverything">
-            <a:extLst>
-              <a:ext uri="{FF2B5EF4-FFF2-40B4-BE49-F238E27FC236}">
-                <a16:creationId xmlns:a16="http://schemas.microsoft.com/office/drawing/2014/main" id="{A1D70F0F-AC3B-4614-A65C-08F48391D5A6}"/>
-              </a:ext>
-            </a:extLst>
-          </p:cNvPr>
-          <p:cNvPicPr>
-            <a:picLocks noChangeAspect="1" noChangeArrowheads="1"/>
-          </p:cNvPicPr>
-          <p:nvPr/>
-        </p:nvPicPr>
-        <p:blipFill rotWithShape="1">
-          <a:blip r:embed="rId2">
-            <a:extLst>
-              <a:ext uri="{28A0092B-C50C-407E-A947-70E740481C1C}">
-                <a14:useLocalDpi xmlns:a14="http://schemas.microsoft.com/office/drawing/2010/main" val="0"/>
-              </a:ext>
-            </a:extLst>
-          </a:blip>
-          <a:srcRect l="3583" r="-1" b="-1"/>
-          <a:stretch/>
-        </p:blipFill>
-        <p:spPr bwMode="auto">
-          <a:xfrm>
-            <a:off x="20" y="0"/>
-            <a:ext cx="9905980" cy="6857990"/>
-          </a:xfrm>
-          <a:prstGeom prst="rect">
-            <a:avLst/>
-          </a:prstGeom>
-          <a:noFill/>
-          <a:extLst>
-            <a:ext uri="{909E8E84-426E-40DD-AFC4-6F175D3DCCD1}">
-              <a14:hiddenFill xmlns:a14="http://schemas.microsoft.com/office/drawing/2010/main">
-                <a:solidFill>
-                  <a:srgbClr val="FFFFFF"/>
-                </a:solidFill>
-              </a14:hiddenFill>
-            </a:ext>
-          </a:extLst>
-        </p:spPr>
-      </p:pic>
-      <p:sp>
-        <p:nvSpPr>
-          <p:cNvPr id="3" name="Textfeld 2">
-            <a:extLst>
-              <a:ext uri="{FF2B5EF4-FFF2-40B4-BE49-F238E27FC236}">
-                <a16:creationId xmlns:a16="http://schemas.microsoft.com/office/drawing/2014/main" id="{F091B76F-A5C4-42DA-80B3-9D62EBB8A537}"/>
-              </a:ext>
-            </a:extLst>
-          </p:cNvPr>
-          <p:cNvSpPr txBox="1"/>
-          <p:nvPr/>
-        </p:nvSpPr>
-        <p:spPr>
-          <a:xfrm rot="5400000">
-            <a:off x="-3608799" y="3377966"/>
-            <a:ext cx="7217597" cy="461665"/>
-          </a:xfrm>
-          <a:prstGeom prst="rect">
-            <a:avLst/>
-          </a:prstGeom>
-          <a:noFill/>
-        </p:spPr>
-        <p:txBody>
-          <a:bodyPr wrap="square" rtlCol="0">
-            <a:spAutoFit/>
-          </a:bodyPr>
-          <a:lstStyle/>
-          <a:p>
-            <a:r>
-              <a:rPr lang="de-DE" sz="1200" dirty="0"/>
-              <a:t>http://juliebestry.com/2013/10/11/tech-planning-on-paper-from-old-fashioned-to-cutting-edge/</a:t>
-            </a:r>
-          </a:p>
-          <a:p>
-            <a:endParaRPr lang="de-DE" sz="1200" dirty="0"/>
-          </a:p>
-        </p:txBody>
-      </p:sp>
-    </p:spTree>
-    <p:extLst>
-      <p:ext uri="{BB962C8B-B14F-4D97-AF65-F5344CB8AC3E}">
-        <p14:creationId xmlns:p14="http://schemas.microsoft.com/office/powerpoint/2010/main" val="3917687404"/>
-      </p:ext>
-    </p:extLst>
-  </p:cSld>
-  <p:clrMapOvr>
-    <a:masterClrMapping/>
-  </p:clrMapOvr>
-</p:sld>
-</file>
-
-<file path=ppt/slides/slide20.xml><?xml version="1.0" encoding="utf-8"?>
+<file path=ppt/slides/slide21.xml><?xml version="1.0" encoding="utf-8"?>
 <p:sld xmlns:a="http://schemas.openxmlformats.org/drawingml/2006/main" xmlns:r="http://schemas.openxmlformats.org/officeDocument/2006/relationships" xmlns:p="http://schemas.openxmlformats.org/presentationml/2006/main">
   <p:cSld>
     <p:spTree>
@@ -13756,7 +14477,7 @@
 </p:sld>
 </file>
 
-<file path=ppt/slides/slide21.xml><?xml version="1.0" encoding="utf-8"?>
+<file path=ppt/slides/slide22.xml><?xml version="1.0" encoding="utf-8"?>
 <p:sld xmlns:a="http://schemas.openxmlformats.org/drawingml/2006/main" xmlns:r="http://schemas.openxmlformats.org/officeDocument/2006/relationships" xmlns:p="http://schemas.openxmlformats.org/presentationml/2006/main">
   <p:cSld>
     <p:spTree>
@@ -13937,104 +14658,93 @@
           <a:chExt cx="0" cy="0"/>
         </a:xfrm>
       </p:grpSpPr>
-      <p:grpSp>
-        <p:nvGrpSpPr>
-          <p:cNvPr id="4" name="Gruppieren 3">
+      <p:pic>
+        <p:nvPicPr>
+          <p:cNvPr id="2" name="Picture 6" descr="StickyJotseverything">
             <a:extLst>
               <a:ext uri="{FF2B5EF4-FFF2-40B4-BE49-F238E27FC236}">
-                <a16:creationId xmlns:a16="http://schemas.microsoft.com/office/drawing/2014/main" id="{D51B3255-5D89-47C0-885D-90DFEA35AF48}"/>
+                <a16:creationId xmlns:a16="http://schemas.microsoft.com/office/drawing/2014/main" id="{A1D70F0F-AC3B-4614-A65C-08F48391D5A6}"/>
               </a:ext>
             </a:extLst>
           </p:cNvPr>
-          <p:cNvGrpSpPr/>
+          <p:cNvPicPr>
+            <a:picLocks noChangeAspect="1" noChangeArrowheads="1"/>
+          </p:cNvPicPr>
           <p:nvPr/>
-        </p:nvGrpSpPr>
-        <p:grpSpPr>
+        </p:nvPicPr>
+        <p:blipFill rotWithShape="1">
+          <a:blip r:embed="rId2">
+            <a:extLst>
+              <a:ext uri="{28A0092B-C50C-407E-A947-70E740481C1C}">
+                <a14:useLocalDpi xmlns:a14="http://schemas.microsoft.com/office/drawing/2010/main" val="0"/>
+              </a:ext>
+            </a:extLst>
+          </a:blip>
+          <a:srcRect l="3583" r="-1" b="-1"/>
+          <a:stretch/>
+        </p:blipFill>
+        <p:spPr bwMode="auto">
           <a:xfrm>
-            <a:off x="276225" y="504825"/>
-            <a:ext cx="9353550" cy="5848350"/>
-            <a:chOff x="919093" y="1352550"/>
-            <a:chExt cx="7105650" cy="4152900"/>
+            <a:off x="20" y="0"/>
+            <a:ext cx="9905980" cy="6857990"/>
           </a:xfrm>
-        </p:grpSpPr>
-        <p:pic>
-          <p:nvPicPr>
-            <p:cNvPr id="5" name="Grafik 4" descr="Ein Bild, das Screenshot enthält.&#10;&#10;Mit sehr hoher Zuverlässigkeit generierte Beschreibung">
-              <a:extLst>
-                <a:ext uri="{FF2B5EF4-FFF2-40B4-BE49-F238E27FC236}">
-                  <a16:creationId xmlns:a16="http://schemas.microsoft.com/office/drawing/2014/main" id="{7471903C-1380-4E06-95AD-1CA5FB8FB425}"/>
-                </a:ext>
-              </a:extLst>
-            </p:cNvPr>
-            <p:cNvPicPr>
-              <a:picLocks noChangeAspect="1"/>
-            </p:cNvPicPr>
-            <p:nvPr/>
-          </p:nvPicPr>
-          <p:blipFill>
-            <a:blip r:embed="rId2">
-              <a:extLst>
-                <a:ext uri="{28A0092B-C50C-407E-A947-70E740481C1C}">
-                  <a14:useLocalDpi xmlns:a14="http://schemas.microsoft.com/office/drawing/2010/main" val="0"/>
-                </a:ext>
-              </a:extLst>
-            </a:blip>
-            <a:stretch>
-              <a:fillRect/>
-            </a:stretch>
-          </p:blipFill>
-          <p:spPr>
-            <a:xfrm>
-              <a:off x="919093" y="1352550"/>
-              <a:ext cx="7105650" cy="4152900"/>
-            </a:xfrm>
-            <a:prstGeom prst="rect">
-              <a:avLst/>
-            </a:prstGeom>
-          </p:spPr>
-        </p:pic>
-        <p:pic>
-          <p:nvPicPr>
-            <p:cNvPr id="6" name="Inhaltsplatzhalter 3" title="ScaleIT_Logo">
-              <a:extLst>
-                <a:ext uri="{FF2B5EF4-FFF2-40B4-BE49-F238E27FC236}">
-                  <a16:creationId xmlns:a16="http://schemas.microsoft.com/office/drawing/2014/main" id="{C41A77B4-E3DE-4C37-B282-5A897ACEF70A}"/>
-                </a:ext>
-              </a:extLst>
-            </p:cNvPr>
-            <p:cNvPicPr>
-              <a:picLocks/>
-            </p:cNvPicPr>
-            <p:nvPr/>
-          </p:nvPicPr>
-          <p:blipFill>
-            <a:blip r:embed="rId3">
-              <a:biLevel thresh="75000"/>
-              <a:extLst>
-                <a:ext uri="{28A0092B-C50C-407E-A947-70E740481C1C}">
-                  <a14:useLocalDpi xmlns:a14="http://schemas.microsoft.com/office/drawing/2010/main" val="0"/>
-                </a:ext>
-              </a:extLst>
-            </a:blip>
-            <a:stretch>
-              <a:fillRect/>
-            </a:stretch>
-          </p:blipFill>
-          <p:spPr>
-            <a:xfrm>
-              <a:off x="4120078" y="1420410"/>
-              <a:ext cx="703679" cy="164764"/>
-            </a:xfrm>
-            <a:prstGeom prst="rect">
-              <a:avLst/>
-            </a:prstGeom>
-          </p:spPr>
-        </p:pic>
-      </p:grpSp>
+          <a:prstGeom prst="rect">
+            <a:avLst/>
+          </a:prstGeom>
+          <a:noFill/>
+          <a:extLst>
+            <a:ext uri="{909E8E84-426E-40DD-AFC4-6F175D3DCCD1}">
+              <a14:hiddenFill xmlns:a14="http://schemas.microsoft.com/office/drawing/2010/main">
+                <a:solidFill>
+                  <a:srgbClr val="FFFFFF"/>
+                </a:solidFill>
+              </a14:hiddenFill>
+            </a:ext>
+          </a:extLst>
+        </p:spPr>
+      </p:pic>
+      <p:sp>
+        <p:nvSpPr>
+          <p:cNvPr id="3" name="Textfeld 2">
+            <a:extLst>
+              <a:ext uri="{FF2B5EF4-FFF2-40B4-BE49-F238E27FC236}">
+                <a16:creationId xmlns:a16="http://schemas.microsoft.com/office/drawing/2014/main" id="{F091B76F-A5C4-42DA-80B3-9D62EBB8A537}"/>
+              </a:ext>
+            </a:extLst>
+          </p:cNvPr>
+          <p:cNvSpPr txBox="1"/>
+          <p:nvPr/>
+        </p:nvSpPr>
+        <p:spPr>
+          <a:xfrm rot="5400000">
+            <a:off x="-3608799" y="3377966"/>
+            <a:ext cx="7217597" cy="461665"/>
+          </a:xfrm>
+          <a:prstGeom prst="rect">
+            <a:avLst/>
+          </a:prstGeom>
+          <a:noFill/>
+        </p:spPr>
+        <p:txBody>
+          <a:bodyPr wrap="square" rtlCol="0">
+            <a:spAutoFit/>
+          </a:bodyPr>
+          <a:lstStyle/>
+          <a:p>
+            <a:r>
+              <a:rPr lang="de-DE" sz="1200" dirty="0"/>
+              <a:t>http://juliebestry.com/2013/10/11/tech-planning-on-paper-from-old-fashioned-to-cutting-edge/</a:t>
+            </a:r>
+          </a:p>
+          <a:p>
+            <a:endParaRPr lang="de-DE" sz="1200" dirty="0"/>
+          </a:p>
+        </p:txBody>
+      </p:sp>
     </p:spTree>
     <p:extLst>
       <p:ext uri="{BB962C8B-B14F-4D97-AF65-F5344CB8AC3E}">
-        <p14:creationId xmlns:p14="http://schemas.microsoft.com/office/powerpoint/2010/main" val="207664725"/>
+        <p14:creationId xmlns:p14="http://schemas.microsoft.com/office/powerpoint/2010/main" val="3917687404"/>
       </p:ext>
     </p:extLst>
   </p:cSld>
@@ -14158,6 +14868,130 @@
     </p:spTree>
     <p:extLst>
       <p:ext uri="{BB962C8B-B14F-4D97-AF65-F5344CB8AC3E}">
+        <p14:creationId xmlns:p14="http://schemas.microsoft.com/office/powerpoint/2010/main" val="207664725"/>
+      </p:ext>
+    </p:extLst>
+  </p:cSld>
+  <p:clrMapOvr>
+    <a:masterClrMapping/>
+  </p:clrMapOvr>
+</p:sld>
+</file>
+
+<file path=ppt/slides/slide5.xml><?xml version="1.0" encoding="utf-8"?>
+<p:sld xmlns:a="http://schemas.openxmlformats.org/drawingml/2006/main" xmlns:r="http://schemas.openxmlformats.org/officeDocument/2006/relationships" xmlns:p="http://schemas.openxmlformats.org/presentationml/2006/main">
+  <p:cSld>
+    <p:spTree>
+      <p:nvGrpSpPr>
+        <p:cNvPr id="1" name=""/>
+        <p:cNvGrpSpPr/>
+        <p:nvPr/>
+      </p:nvGrpSpPr>
+      <p:grpSpPr>
+        <a:xfrm>
+          <a:off x="0" y="0"/>
+          <a:ext cx="0" cy="0"/>
+          <a:chOff x="0" y="0"/>
+          <a:chExt cx="0" cy="0"/>
+        </a:xfrm>
+      </p:grpSpPr>
+      <p:grpSp>
+        <p:nvGrpSpPr>
+          <p:cNvPr id="4" name="Gruppieren 3">
+            <a:extLst>
+              <a:ext uri="{FF2B5EF4-FFF2-40B4-BE49-F238E27FC236}">
+                <a16:creationId xmlns:a16="http://schemas.microsoft.com/office/drawing/2014/main" id="{D51B3255-5D89-47C0-885D-90DFEA35AF48}"/>
+              </a:ext>
+            </a:extLst>
+          </p:cNvPr>
+          <p:cNvGrpSpPr/>
+          <p:nvPr/>
+        </p:nvGrpSpPr>
+        <p:grpSpPr>
+          <a:xfrm>
+            <a:off x="276225" y="504825"/>
+            <a:ext cx="9353550" cy="5848350"/>
+            <a:chOff x="919093" y="1352550"/>
+            <a:chExt cx="7105650" cy="4152900"/>
+          </a:xfrm>
+        </p:grpSpPr>
+        <p:pic>
+          <p:nvPicPr>
+            <p:cNvPr id="5" name="Grafik 4" descr="Ein Bild, das Screenshot enthält.&#10;&#10;Mit sehr hoher Zuverlässigkeit generierte Beschreibung">
+              <a:extLst>
+                <a:ext uri="{FF2B5EF4-FFF2-40B4-BE49-F238E27FC236}">
+                  <a16:creationId xmlns:a16="http://schemas.microsoft.com/office/drawing/2014/main" id="{7471903C-1380-4E06-95AD-1CA5FB8FB425}"/>
+                </a:ext>
+              </a:extLst>
+            </p:cNvPr>
+            <p:cNvPicPr>
+              <a:picLocks noChangeAspect="1"/>
+            </p:cNvPicPr>
+            <p:nvPr/>
+          </p:nvPicPr>
+          <p:blipFill>
+            <a:blip r:embed="rId2">
+              <a:extLst>
+                <a:ext uri="{28A0092B-C50C-407E-A947-70E740481C1C}">
+                  <a14:useLocalDpi xmlns:a14="http://schemas.microsoft.com/office/drawing/2010/main" val="0"/>
+                </a:ext>
+              </a:extLst>
+            </a:blip>
+            <a:stretch>
+              <a:fillRect/>
+            </a:stretch>
+          </p:blipFill>
+          <p:spPr>
+            <a:xfrm>
+              <a:off x="919093" y="1352550"/>
+              <a:ext cx="7105650" cy="4152900"/>
+            </a:xfrm>
+            <a:prstGeom prst="rect">
+              <a:avLst/>
+            </a:prstGeom>
+          </p:spPr>
+        </p:pic>
+        <p:pic>
+          <p:nvPicPr>
+            <p:cNvPr id="6" name="Inhaltsplatzhalter 3" title="ScaleIT_Logo">
+              <a:extLst>
+                <a:ext uri="{FF2B5EF4-FFF2-40B4-BE49-F238E27FC236}">
+                  <a16:creationId xmlns:a16="http://schemas.microsoft.com/office/drawing/2014/main" id="{C41A77B4-E3DE-4C37-B282-5A897ACEF70A}"/>
+                </a:ext>
+              </a:extLst>
+            </p:cNvPr>
+            <p:cNvPicPr>
+              <a:picLocks/>
+            </p:cNvPicPr>
+            <p:nvPr/>
+          </p:nvPicPr>
+          <p:blipFill>
+            <a:blip r:embed="rId3">
+              <a:biLevel thresh="75000"/>
+              <a:extLst>
+                <a:ext uri="{28A0092B-C50C-407E-A947-70E740481C1C}">
+                  <a14:useLocalDpi xmlns:a14="http://schemas.microsoft.com/office/drawing/2010/main" val="0"/>
+                </a:ext>
+              </a:extLst>
+            </a:blip>
+            <a:stretch>
+              <a:fillRect/>
+            </a:stretch>
+          </p:blipFill>
+          <p:spPr>
+            <a:xfrm>
+              <a:off x="4120078" y="1420410"/>
+              <a:ext cx="703679" cy="164764"/>
+            </a:xfrm>
+            <a:prstGeom prst="rect">
+              <a:avLst/>
+            </a:prstGeom>
+          </p:spPr>
+        </p:pic>
+      </p:grpSp>
+    </p:spTree>
+    <p:extLst>
+      <p:ext uri="{BB962C8B-B14F-4D97-AF65-F5344CB8AC3E}">
         <p14:creationId xmlns:p14="http://schemas.microsoft.com/office/powerpoint/2010/main" val="2554900847"/>
       </p:ext>
     </p:extLst>
@@ -14168,7 +15002,7 @@
 </p:sld>
 </file>
 
-<file path=ppt/slides/slide5.xml><?xml version="1.0" encoding="utf-8"?>
+<file path=ppt/slides/slide6.xml><?xml version="1.0" encoding="utf-8"?>
 <p:sld xmlns:a="http://schemas.openxmlformats.org/drawingml/2006/main" xmlns:r="http://schemas.openxmlformats.org/officeDocument/2006/relationships" xmlns:p="http://schemas.openxmlformats.org/presentationml/2006/main">
   <p:cSld>
     <p:spTree>
@@ -16552,7 +17386,7 @@
 </p:sld>
 </file>
 
-<file path=ppt/slides/slide6.xml><?xml version="1.0" encoding="utf-8"?>
+<file path=ppt/slides/slide7.xml><?xml version="1.0" encoding="utf-8"?>
 <p:sld xmlns:a="http://schemas.openxmlformats.org/drawingml/2006/main" xmlns:r="http://schemas.openxmlformats.org/officeDocument/2006/relationships" xmlns:p="http://schemas.openxmlformats.org/presentationml/2006/main">
   <p:cSld>
     <p:spTree>
@@ -18936,7 +19770,7 @@
 </p:sld>
 </file>
 
-<file path=ppt/slides/slide7.xml><?xml version="1.0" encoding="utf-8"?>
+<file path=ppt/slides/slide8.xml><?xml version="1.0" encoding="utf-8"?>
 <p:sld xmlns:a="http://schemas.openxmlformats.org/drawingml/2006/main" xmlns:r="http://schemas.openxmlformats.org/officeDocument/2006/relationships" xmlns:p="http://schemas.openxmlformats.org/presentationml/2006/main">
   <p:cSld>
     <p:spTree>
@@ -19111,7 +19945,7 @@
 </p:sld>
 </file>
 
-<file path=ppt/slides/slide8.xml><?xml version="1.0" encoding="utf-8"?>
+<file path=ppt/slides/slide9.xml><?xml version="1.0" encoding="utf-8"?>
 <p:sld xmlns:a="http://schemas.openxmlformats.org/drawingml/2006/main" xmlns:r="http://schemas.openxmlformats.org/officeDocument/2006/relationships" xmlns:p="http://schemas.openxmlformats.org/presentationml/2006/main">
   <p:cSld>
     <p:spTree>
@@ -19277,397 +20111,6 @@
     <p:extLst>
       <p:ext uri="{BB962C8B-B14F-4D97-AF65-F5344CB8AC3E}">
         <p14:creationId xmlns:p14="http://schemas.microsoft.com/office/powerpoint/2010/main" val="1150310636"/>
-      </p:ext>
-    </p:extLst>
-  </p:cSld>
-  <p:clrMapOvr>
-    <a:masterClrMapping/>
-  </p:clrMapOvr>
-</p:sld>
-</file>
-
-<file path=ppt/slides/slide9.xml><?xml version="1.0" encoding="utf-8"?>
-<p:sld xmlns:a="http://schemas.openxmlformats.org/drawingml/2006/main" xmlns:r="http://schemas.openxmlformats.org/officeDocument/2006/relationships" xmlns:p="http://schemas.openxmlformats.org/presentationml/2006/main">
-  <p:cSld>
-    <p:spTree>
-      <p:nvGrpSpPr>
-        <p:cNvPr id="1" name=""/>
-        <p:cNvGrpSpPr/>
-        <p:nvPr/>
-      </p:nvGrpSpPr>
-      <p:grpSpPr>
-        <a:xfrm>
-          <a:off x="0" y="0"/>
-          <a:ext cx="0" cy="0"/>
-          <a:chOff x="0" y="0"/>
-          <a:chExt cx="0" cy="0"/>
-        </a:xfrm>
-      </p:grpSpPr>
-      <p:grpSp>
-        <p:nvGrpSpPr>
-          <p:cNvPr id="3" name="Gruppieren 2">
-            <a:extLst>
-              <a:ext uri="{FF2B5EF4-FFF2-40B4-BE49-F238E27FC236}">
-                <a16:creationId xmlns:a16="http://schemas.microsoft.com/office/drawing/2014/main" id="{FC53B0ED-9C6A-4AC2-981D-6AD57E3B6C8D}"/>
-              </a:ext>
-            </a:extLst>
-          </p:cNvPr>
-          <p:cNvGrpSpPr/>
-          <p:nvPr/>
-        </p:nvGrpSpPr>
-        <p:grpSpPr>
-          <a:xfrm>
-            <a:off x="-298176" y="-1524000"/>
-            <a:ext cx="10707756" cy="9892747"/>
-            <a:chOff x="846936" y="205366"/>
-            <a:chExt cx="5645485" cy="5645485"/>
-          </a:xfrm>
-        </p:grpSpPr>
-        <p:pic>
-          <p:nvPicPr>
-            <p:cNvPr id="8" name="Grafik 7" descr="Tablet">
-              <a:extLst>
-                <a:ext uri="{FF2B5EF4-FFF2-40B4-BE49-F238E27FC236}">
-                  <a16:creationId xmlns:a16="http://schemas.microsoft.com/office/drawing/2014/main" id="{2488CA38-3AC8-4185-B7CF-5C53D516A786}"/>
-                </a:ext>
-              </a:extLst>
-            </p:cNvPr>
-            <p:cNvPicPr>
-              <a:picLocks noChangeAspect="1"/>
-            </p:cNvPicPr>
-            <p:nvPr/>
-          </p:nvPicPr>
-          <p:blipFill>
-            <a:blip r:embed="rId2">
-              <a:extLst>
-                <a:ext uri="{28A0092B-C50C-407E-A947-70E740481C1C}">
-                  <a14:useLocalDpi xmlns:a14="http://schemas.microsoft.com/office/drawing/2010/main" val="0"/>
-                </a:ext>
-                <a:ext uri="{96DAC541-7B7A-43D3-8B79-37D633B846F1}">
-                  <asvg:svgBlip xmlns:asvg="http://schemas.microsoft.com/office/drawing/2016/SVG/main" r:embed="rId3"/>
-                </a:ext>
-              </a:extLst>
-            </a:blip>
-            <a:stretch>
-              <a:fillRect/>
-            </a:stretch>
-          </p:blipFill>
-          <p:spPr>
-            <a:xfrm>
-              <a:off x="846936" y="205366"/>
-              <a:ext cx="5645485" cy="5645485"/>
-            </a:xfrm>
-            <a:prstGeom prst="rect">
-              <a:avLst/>
-            </a:prstGeom>
-          </p:spPr>
-        </p:pic>
-        <p:pic>
-          <p:nvPicPr>
-            <p:cNvPr id="9" name="Inhaltsplatzhalter 3" title="ScaleIT_Logo">
-              <a:extLst>
-                <a:ext uri="{FF2B5EF4-FFF2-40B4-BE49-F238E27FC236}">
-                  <a16:creationId xmlns:a16="http://schemas.microsoft.com/office/drawing/2014/main" id="{55D8DB2A-C0E2-4BD1-AC21-EE1BF356B939}"/>
-                </a:ext>
-              </a:extLst>
-            </p:cNvPr>
-            <p:cNvPicPr>
-              <a:picLocks/>
-            </p:cNvPicPr>
-            <p:nvPr/>
-          </p:nvPicPr>
-          <p:blipFill>
-            <a:blip r:embed="rId4">
-              <a:extLst>
-                <a:ext uri="{28A0092B-C50C-407E-A947-70E740481C1C}">
-                  <a14:useLocalDpi xmlns:a14="http://schemas.microsoft.com/office/drawing/2010/main" val="0"/>
-                </a:ext>
-              </a:extLst>
-            </a:blip>
-            <a:stretch>
-              <a:fillRect/>
-            </a:stretch>
-          </p:blipFill>
-          <p:spPr>
-            <a:xfrm>
-              <a:off x="5377998" y="4491474"/>
-              <a:ext cx="477550" cy="138017"/>
-            </a:xfrm>
-            <a:prstGeom prst="rect">
-              <a:avLst/>
-            </a:prstGeom>
-          </p:spPr>
-        </p:pic>
-      </p:grpSp>
-      <p:sp>
-        <p:nvSpPr>
-          <p:cNvPr id="10" name="Rechteck 9">
-            <a:extLst>
-              <a:ext uri="{FF2B5EF4-FFF2-40B4-BE49-F238E27FC236}">
-                <a16:creationId xmlns:a16="http://schemas.microsoft.com/office/drawing/2014/main" id="{4680C422-D169-4A66-B99B-8E6887C84B4F}"/>
-              </a:ext>
-            </a:extLst>
-          </p:cNvPr>
-          <p:cNvSpPr/>
-          <p:nvPr/>
-        </p:nvSpPr>
-        <p:spPr>
-          <a:xfrm>
-            <a:off x="801756" y="715618"/>
-            <a:ext cx="8479382" cy="5221356"/>
-          </a:xfrm>
-          <a:prstGeom prst="rect">
-            <a:avLst/>
-          </a:prstGeom>
-          <a:ln>
-            <a:solidFill>
-              <a:schemeClr val="tx1"/>
-            </a:solidFill>
-          </a:ln>
-        </p:spPr>
-        <p:style>
-          <a:lnRef idx="2">
-            <a:schemeClr val="accent6"/>
-          </a:lnRef>
-          <a:fillRef idx="1">
-            <a:schemeClr val="lt1"/>
-          </a:fillRef>
-          <a:effectRef idx="0">
-            <a:schemeClr val="accent6"/>
-          </a:effectRef>
-          <a:fontRef idx="minor">
-            <a:schemeClr val="dk1"/>
-          </a:fontRef>
-        </p:style>
-        <p:txBody>
-          <a:bodyPr rtlCol="0" anchor="ctr"/>
-          <a:lstStyle/>
-          <a:p>
-            <a:pPr algn="ctr"/>
-            <a:endParaRPr lang="de-DE"/>
-          </a:p>
-        </p:txBody>
-      </p:sp>
-      <p:sp>
-        <p:nvSpPr>
-          <p:cNvPr id="12" name="Rechteck 11">
-            <a:extLst>
-              <a:ext uri="{FF2B5EF4-FFF2-40B4-BE49-F238E27FC236}">
-                <a16:creationId xmlns:a16="http://schemas.microsoft.com/office/drawing/2014/main" id="{DBD22CEB-E33F-4E4B-9213-AEF84E86B40A}"/>
-              </a:ext>
-            </a:extLst>
-          </p:cNvPr>
-          <p:cNvSpPr/>
-          <p:nvPr/>
-        </p:nvSpPr>
-        <p:spPr>
-          <a:xfrm>
-            <a:off x="3922643" y="5943600"/>
-            <a:ext cx="2199861" cy="218661"/>
-          </a:xfrm>
-          <a:prstGeom prst="rect">
-            <a:avLst/>
-          </a:prstGeom>
-          <a:solidFill>
-            <a:schemeClr val="tx1"/>
-          </a:solidFill>
-          <a:ln>
-            <a:solidFill>
-              <a:schemeClr val="tx1"/>
-            </a:solidFill>
-          </a:ln>
-        </p:spPr>
-        <p:style>
-          <a:lnRef idx="2">
-            <a:schemeClr val="accent1">
-              <a:shade val="50000"/>
-            </a:schemeClr>
-          </a:lnRef>
-          <a:fillRef idx="1">
-            <a:schemeClr val="accent1"/>
-          </a:fillRef>
-          <a:effectRef idx="0">
-            <a:schemeClr val="accent1"/>
-          </a:effectRef>
-          <a:fontRef idx="minor">
-            <a:schemeClr val="lt1"/>
-          </a:fontRef>
-        </p:style>
-        <p:txBody>
-          <a:bodyPr rtlCol="0" anchor="ctr"/>
-          <a:lstStyle/>
-          <a:p>
-            <a:pPr algn="ctr"/>
-            <a:endParaRPr lang="de-DE"/>
-          </a:p>
-        </p:txBody>
-      </p:sp>
-      <p:sp>
-        <p:nvSpPr>
-          <p:cNvPr id="13" name="Ellipse 12">
-            <a:extLst>
-              <a:ext uri="{FF2B5EF4-FFF2-40B4-BE49-F238E27FC236}">
-                <a16:creationId xmlns:a16="http://schemas.microsoft.com/office/drawing/2014/main" id="{23E50D8B-64CE-4B16-A213-5B1B26C52A5F}"/>
-              </a:ext>
-            </a:extLst>
-          </p:cNvPr>
-          <p:cNvSpPr/>
-          <p:nvPr/>
-        </p:nvSpPr>
-        <p:spPr>
-          <a:xfrm>
-            <a:off x="4938742" y="6026425"/>
-            <a:ext cx="205409" cy="205409"/>
-          </a:xfrm>
-          <a:prstGeom prst="ellipse">
-            <a:avLst/>
-          </a:prstGeom>
-          <a:solidFill>
-            <a:schemeClr val="bg1"/>
-          </a:solidFill>
-          <a:ln>
-            <a:solidFill>
-              <a:schemeClr val="tx1"/>
-            </a:solidFill>
-          </a:ln>
-        </p:spPr>
-        <p:style>
-          <a:lnRef idx="2">
-            <a:schemeClr val="accent1">
-              <a:shade val="50000"/>
-            </a:schemeClr>
-          </a:lnRef>
-          <a:fillRef idx="1">
-            <a:schemeClr val="accent1"/>
-          </a:fillRef>
-          <a:effectRef idx="0">
-            <a:schemeClr val="accent1"/>
-          </a:effectRef>
-          <a:fontRef idx="minor">
-            <a:schemeClr val="lt1"/>
-          </a:fontRef>
-        </p:style>
-        <p:txBody>
-          <a:bodyPr rtlCol="0" anchor="ctr"/>
-          <a:lstStyle/>
-          <a:p>
-            <a:pPr algn="ctr"/>
-            <a:endParaRPr lang="de-DE"/>
-          </a:p>
-        </p:txBody>
-      </p:sp>
-      <p:pic>
-        <p:nvPicPr>
-          <p:cNvPr id="14" name="Grafik 13">
-            <a:extLst>
-              <a:ext uri="{FF2B5EF4-FFF2-40B4-BE49-F238E27FC236}">
-                <a16:creationId xmlns:a16="http://schemas.microsoft.com/office/drawing/2014/main" id="{454CF4C6-0464-41E3-90AE-891BF851BFA7}"/>
-              </a:ext>
-            </a:extLst>
-          </p:cNvPr>
-          <p:cNvPicPr>
-            <a:picLocks noChangeAspect="1"/>
-          </p:cNvPicPr>
-          <p:nvPr/>
-        </p:nvPicPr>
-        <p:blipFill>
-          <a:blip r:embed="rId5">
-            <a:extLst>
-              <a:ext uri="{28A0092B-C50C-407E-A947-70E740481C1C}">
-                <a14:useLocalDpi xmlns:a14="http://schemas.microsoft.com/office/drawing/2010/main" val="0"/>
-              </a:ext>
-            </a:extLst>
-          </a:blip>
-          <a:stretch>
-            <a:fillRect/>
-          </a:stretch>
-        </p:blipFill>
-        <p:spPr>
-          <a:xfrm>
-            <a:off x="876939" y="754462"/>
-            <a:ext cx="257628" cy="238019"/>
-          </a:xfrm>
-          <a:prstGeom prst="rect">
-            <a:avLst/>
-          </a:prstGeom>
-        </p:spPr>
-      </p:pic>
-      <p:pic>
-        <p:nvPicPr>
-          <p:cNvPr id="15" name="Grafik 14">
-            <a:extLst>
-              <a:ext uri="{FF2B5EF4-FFF2-40B4-BE49-F238E27FC236}">
-                <a16:creationId xmlns:a16="http://schemas.microsoft.com/office/drawing/2014/main" id="{D0E52042-E5F0-4DC4-B637-EF6E3FF376D2}"/>
-              </a:ext>
-            </a:extLst>
-          </p:cNvPr>
-          <p:cNvPicPr>
-            <a:picLocks noChangeAspect="1"/>
-          </p:cNvPicPr>
-          <p:nvPr/>
-        </p:nvPicPr>
-        <p:blipFill>
-          <a:blip r:embed="rId6">
-            <a:extLst>
-              <a:ext uri="{28A0092B-C50C-407E-A947-70E740481C1C}">
-                <a14:useLocalDpi xmlns:a14="http://schemas.microsoft.com/office/drawing/2010/main" val="0"/>
-              </a:ext>
-            </a:extLst>
-          </a:blip>
-          <a:stretch>
-            <a:fillRect/>
-          </a:stretch>
-        </p:blipFill>
-        <p:spPr>
-          <a:xfrm rot="16200000">
-            <a:off x="1302752" y="701933"/>
-            <a:ext cx="332210" cy="359579"/>
-          </a:xfrm>
-          <a:prstGeom prst="rect">
-            <a:avLst/>
-          </a:prstGeom>
-        </p:spPr>
-      </p:pic>
-      <p:pic>
-        <p:nvPicPr>
-          <p:cNvPr id="16" name="Grafik 15">
-            <a:extLst>
-              <a:ext uri="{FF2B5EF4-FFF2-40B4-BE49-F238E27FC236}">
-                <a16:creationId xmlns:a16="http://schemas.microsoft.com/office/drawing/2014/main" id="{B2E3FD90-BB71-4CD2-BCE6-85F6BFCDB57D}"/>
-              </a:ext>
-            </a:extLst>
-          </p:cNvPr>
-          <p:cNvPicPr>
-            <a:picLocks noChangeAspect="1"/>
-          </p:cNvPicPr>
-          <p:nvPr/>
-        </p:nvPicPr>
-        <p:blipFill>
-          <a:blip r:embed="rId7">
-            <a:extLst>
-              <a:ext uri="{28A0092B-C50C-407E-A947-70E740481C1C}">
-                <a14:useLocalDpi xmlns:a14="http://schemas.microsoft.com/office/drawing/2010/main" val="0"/>
-              </a:ext>
-            </a:extLst>
-          </a:blip>
-          <a:stretch>
-            <a:fillRect/>
-          </a:stretch>
-        </p:blipFill>
-        <p:spPr>
-          <a:xfrm>
-            <a:off x="1827035" y="758212"/>
-            <a:ext cx="253569" cy="234269"/>
-          </a:xfrm>
-          <a:prstGeom prst="rect">
-            <a:avLst/>
-          </a:prstGeom>
-        </p:spPr>
-      </p:pic>
-    </p:spTree>
-    <p:extLst>
-      <p:ext uri="{BB962C8B-B14F-4D97-AF65-F5344CB8AC3E}">
-        <p14:creationId xmlns:p14="http://schemas.microsoft.com/office/powerpoint/2010/main" val="3777763640"/>
       </p:ext>
     </p:extLst>
   </p:cSld>

</xml_diff>

<commit_message>
fixed #4; added new browser window mockup; made by @laurahalbmann
</commit_message>
<xml_diff>
--- a/Prototyping Materials.pptx
+++ b/Prototyping Materials.pptx
@@ -8,8 +8,8 @@
     <p:sldId id="319" r:id="rId2"/>
     <p:sldId id="330" r:id="rId3"/>
     <p:sldId id="318" r:id="rId4"/>
-    <p:sldId id="320" r:id="rId5"/>
-    <p:sldId id="321" r:id="rId6"/>
+    <p:sldId id="332" r:id="rId5"/>
+    <p:sldId id="333" r:id="rId6"/>
     <p:sldId id="322" r:id="rId7"/>
     <p:sldId id="323" r:id="rId8"/>
     <p:sldId id="324" r:id="rId9"/>
@@ -137,8 +137,8 @@
         </p14:section>
         <p14:section name="Benutzeroberflächen" id="{971D82AC-BFA5-4A86-AFE9-EC6A0C73D966}">
           <p14:sldIdLst>
-            <p14:sldId id="320"/>
-            <p14:sldId id="321"/>
+            <p14:sldId id="332"/>
+            <p14:sldId id="333"/>
             <p14:sldId id="322"/>
             <p14:sldId id="323"/>
             <p14:sldId id="324"/>
@@ -4785,7 +4785,7 @@
           <a:p>
             <a:fld id="{6CFF613B-2A9F-46DD-9629-249B4C8727B5}" type="datetimeFigureOut">
               <a:rPr lang="de-DE" smtClean="0"/>
-              <a:t>22.01.18</a:t>
+              <a:t>01.02.18</a:t>
             </a:fld>
             <a:endParaRPr lang="de-DE"/>
           </a:p>
@@ -4955,7 +4955,7 @@
           <a:p>
             <a:fld id="{6CFF613B-2A9F-46DD-9629-249B4C8727B5}" type="datetimeFigureOut">
               <a:rPr lang="de-DE" smtClean="0"/>
-              <a:t>22.01.18</a:t>
+              <a:t>01.02.18</a:t>
             </a:fld>
             <a:endParaRPr lang="de-DE"/>
           </a:p>
@@ -5135,7 +5135,7 @@
           <a:p>
             <a:fld id="{6CFF613B-2A9F-46DD-9629-249B4C8727B5}" type="datetimeFigureOut">
               <a:rPr lang="de-DE" smtClean="0"/>
-              <a:t>22.01.18</a:t>
+              <a:t>01.02.18</a:t>
             </a:fld>
             <a:endParaRPr lang="de-DE"/>
           </a:p>
@@ -5959,7 +5959,7 @@
           <a:p>
             <a:fld id="{6CFF613B-2A9F-46DD-9629-249B4C8727B5}" type="datetimeFigureOut">
               <a:rPr lang="de-DE" smtClean="0"/>
-              <a:t>22.01.18</a:t>
+              <a:t>01.02.18</a:t>
             </a:fld>
             <a:endParaRPr lang="de-DE"/>
           </a:p>
@@ -6203,7 +6203,7 @@
           <a:p>
             <a:fld id="{6CFF613B-2A9F-46DD-9629-249B4C8727B5}" type="datetimeFigureOut">
               <a:rPr lang="de-DE" smtClean="0"/>
-              <a:t>22.01.18</a:t>
+              <a:t>01.02.18</a:t>
             </a:fld>
             <a:endParaRPr lang="de-DE"/>
           </a:p>
@@ -6435,7 +6435,7 @@
           <a:p>
             <a:fld id="{6CFF613B-2A9F-46DD-9629-249B4C8727B5}" type="datetimeFigureOut">
               <a:rPr lang="de-DE" smtClean="0"/>
-              <a:t>22.01.18</a:t>
+              <a:t>01.02.18</a:t>
             </a:fld>
             <a:endParaRPr lang="de-DE"/>
           </a:p>
@@ -6802,7 +6802,7 @@
           <a:p>
             <a:fld id="{6CFF613B-2A9F-46DD-9629-249B4C8727B5}" type="datetimeFigureOut">
               <a:rPr lang="de-DE" smtClean="0"/>
-              <a:t>22.01.18</a:t>
+              <a:t>01.02.18</a:t>
             </a:fld>
             <a:endParaRPr lang="de-DE"/>
           </a:p>
@@ -6920,7 +6920,7 @@
           <a:p>
             <a:fld id="{6CFF613B-2A9F-46DD-9629-249B4C8727B5}" type="datetimeFigureOut">
               <a:rPr lang="de-DE" smtClean="0"/>
-              <a:t>22.01.18</a:t>
+              <a:t>01.02.18</a:t>
             </a:fld>
             <a:endParaRPr lang="de-DE"/>
           </a:p>
@@ -7015,7 +7015,7 @@
           <a:p>
             <a:fld id="{6CFF613B-2A9F-46DD-9629-249B4C8727B5}" type="datetimeFigureOut">
               <a:rPr lang="de-DE" smtClean="0"/>
-              <a:t>22.01.18</a:t>
+              <a:t>01.02.18</a:t>
             </a:fld>
             <a:endParaRPr lang="de-DE"/>
           </a:p>
@@ -7292,7 +7292,7 @@
           <a:p>
             <a:fld id="{6CFF613B-2A9F-46DD-9629-249B4C8727B5}" type="datetimeFigureOut">
               <a:rPr lang="de-DE" smtClean="0"/>
-              <a:t>22.01.18</a:t>
+              <a:t>01.02.18</a:t>
             </a:fld>
             <a:endParaRPr lang="de-DE"/>
           </a:p>
@@ -7549,7 +7549,7 @@
           <a:p>
             <a:fld id="{6CFF613B-2A9F-46DD-9629-249B4C8727B5}" type="datetimeFigureOut">
               <a:rPr lang="de-DE" smtClean="0"/>
-              <a:t>22.01.18</a:t>
+              <a:t>01.02.18</a:t>
             </a:fld>
             <a:endParaRPr lang="de-DE"/>
           </a:p>
@@ -7762,7 +7762,7 @@
           <a:p>
             <a:fld id="{6CFF613B-2A9F-46DD-9629-249B4C8727B5}" type="datetimeFigureOut">
               <a:rPr lang="de-DE" smtClean="0"/>
-              <a:t>22.01.18</a:t>
+              <a:t>01.02.18</a:t>
             </a:fld>
             <a:endParaRPr lang="de-DE"/>
           </a:p>
@@ -8168,335 +8168,337 @@
           <a:chExt cx="0" cy="0"/>
         </a:xfrm>
       </p:grpSpPr>
-      <p:grpSp>
-        <p:nvGrpSpPr>
-          <p:cNvPr id="15" name="Group 14"/>
-          <p:cNvGrpSpPr/>
+      <p:pic>
+        <p:nvPicPr>
+          <p:cNvPr id="6" name="Picture 5"/>
+          <p:cNvPicPr>
+            <a:picLocks noChangeAspect="1"/>
+          </p:cNvPicPr>
           <p:nvPr/>
-        </p:nvGrpSpPr>
-        <p:grpSpPr>
-          <a:xfrm>
-            <a:off x="2019299" y="2215253"/>
-            <a:ext cx="6247997" cy="2876541"/>
-            <a:chOff x="1366714" y="1320506"/>
-            <a:chExt cx="10348502" cy="4764389"/>
-          </a:xfrm>
-        </p:grpSpPr>
-        <p:pic>
-          <p:nvPicPr>
-            <p:cNvPr id="6" name="Picture 5"/>
-            <p:cNvPicPr>
-              <a:picLocks noChangeAspect="1"/>
-            </p:cNvPicPr>
-            <p:nvPr/>
-          </p:nvPicPr>
-          <p:blipFill rotWithShape="1">
-            <a:blip r:embed="rId2">
-              <a:extLst>
-                <a:ext uri="{28A0092B-C50C-407E-A947-70E740481C1C}">
-                  <a14:useLocalDpi xmlns:a14="http://schemas.microsoft.com/office/drawing/2010/main" val="0"/>
-                </a:ext>
-              </a:extLst>
-            </a:blip>
-            <a:srcRect l="27188" t="39946" r="29219" b="40300"/>
-            <a:stretch/>
-          </p:blipFill>
-          <p:spPr>
-            <a:xfrm>
-              <a:off x="4538902" y="1320506"/>
-              <a:ext cx="4228166" cy="1049709"/>
-            </a:xfrm>
-            <a:prstGeom prst="rect">
-              <a:avLst/>
-            </a:prstGeom>
-          </p:spPr>
-        </p:pic>
-        <p:sp>
-          <p:nvSpPr>
-            <p:cNvPr id="7" name="TextBox 6"/>
-            <p:cNvSpPr txBox="1"/>
-            <p:nvPr/>
-          </p:nvSpPr>
-          <p:spPr>
-            <a:xfrm>
-              <a:off x="4863543" y="2278188"/>
-              <a:ext cx="3291932" cy="484280"/>
-            </a:xfrm>
-            <a:prstGeom prst="rect">
-              <a:avLst/>
-            </a:prstGeom>
-            <a:noFill/>
-          </p:spPr>
-          <p:txBody>
-            <a:bodyPr wrap="none" rtlCol="0">
-              <a:spAutoFit/>
-            </a:bodyPr>
-            <a:lstStyle/>
-            <a:p>
-              <a:r>
-                <a:rPr lang="en-US" sz="1300" b="1" dirty="0"/>
-                <a:t>App Paper Prototyping Kit</a:t>
-              </a:r>
-            </a:p>
-          </p:txBody>
-        </p:sp>
-        <p:pic>
-          <p:nvPicPr>
-            <p:cNvPr id="2050" name="Picture 2" descr="ithub Logotype"/>
-            <p:cNvPicPr>
-              <a:picLocks noChangeAspect="1" noChangeArrowheads="1"/>
-            </p:cNvPicPr>
-            <p:nvPr/>
-          </p:nvPicPr>
-          <p:blipFill>
-            <a:blip r:embed="rId3">
-              <a:extLst>
-                <a:ext uri="{28A0092B-C50C-407E-A947-70E740481C1C}">
-                  <a14:useLocalDpi xmlns:a14="http://schemas.microsoft.com/office/drawing/2010/main" val="0"/>
-                </a:ext>
-              </a:extLst>
-            </a:blip>
-            <a:srcRect/>
-            <a:stretch>
-              <a:fillRect/>
-            </a:stretch>
-          </p:blipFill>
-          <p:spPr bwMode="auto">
-            <a:xfrm>
-              <a:off x="4648200" y="3221077"/>
-              <a:ext cx="1595032" cy="414707"/>
-            </a:xfrm>
-            <a:prstGeom prst="rect">
-              <a:avLst/>
-            </a:prstGeom>
-            <a:noFill/>
+        </p:nvPicPr>
+        <p:blipFill rotWithShape="1">
+          <a:blip r:embed="rId2">
             <a:extLst>
-              <a:ext uri="{909E8E84-426E-40DD-AFC4-6F175D3DCCD1}">
-                <a14:hiddenFill xmlns:a14="http://schemas.microsoft.com/office/drawing/2010/main">
-                  <a:solidFill>
-                    <a:srgbClr val="FFFFFF"/>
-                  </a:solidFill>
-                </a14:hiddenFill>
+              <a:ext uri="{28A0092B-C50C-407E-A947-70E740481C1C}">
+                <a14:useLocalDpi xmlns:a14="http://schemas.microsoft.com/office/drawing/2010/main" val="0"/>
               </a:ext>
             </a:extLst>
-          </p:spPr>
-        </p:pic>
-        <p:pic>
-          <p:nvPicPr>
-            <p:cNvPr id="2052" name="Picture 4" descr="ithub Octocat"/>
-            <p:cNvPicPr>
-              <a:picLocks noChangeAspect="1" noChangeArrowheads="1"/>
-            </p:cNvPicPr>
-            <p:nvPr/>
-          </p:nvPicPr>
-          <p:blipFill>
-            <a:blip r:embed="rId4">
-              <a:extLst>
-                <a:ext uri="{28A0092B-C50C-407E-A947-70E740481C1C}">
-                  <a14:useLocalDpi xmlns:a14="http://schemas.microsoft.com/office/drawing/2010/main" val="0"/>
-                </a:ext>
-              </a:extLst>
-            </a:blip>
-            <a:srcRect/>
-            <a:stretch>
-              <a:fillRect/>
-            </a:stretch>
-          </p:blipFill>
-          <p:spPr bwMode="auto">
-            <a:xfrm>
-              <a:off x="6243231" y="2996548"/>
-              <a:ext cx="1043051" cy="862887"/>
-            </a:xfrm>
-            <a:prstGeom prst="rect">
-              <a:avLst/>
-            </a:prstGeom>
-            <a:noFill/>
-            <a:extLst>
-              <a:ext uri="{909E8E84-426E-40DD-AFC4-6F175D3DCCD1}">
-                <a14:hiddenFill xmlns:a14="http://schemas.microsoft.com/office/drawing/2010/main">
-                  <a:solidFill>
-                    <a:srgbClr val="FFFFFF"/>
-                  </a:solidFill>
-                </a14:hiddenFill>
-              </a:ext>
-            </a:extLst>
-          </p:spPr>
-        </p:pic>
-        <p:pic>
-          <p:nvPicPr>
-            <p:cNvPr id="11" name="Picture 10"/>
-            <p:cNvPicPr>
-              <a:picLocks noChangeAspect="1"/>
-            </p:cNvPicPr>
-            <p:nvPr/>
-          </p:nvPicPr>
-          <p:blipFill>
-            <a:blip r:embed="rId5">
-              <a:extLst>
-                <a:ext uri="{28A0092B-C50C-407E-A947-70E740481C1C}">
-                  <a14:useLocalDpi xmlns:a14="http://schemas.microsoft.com/office/drawing/2010/main" val="0"/>
-                </a:ext>
-              </a:extLst>
-            </a:blip>
-            <a:stretch>
-              <a:fillRect/>
-            </a:stretch>
-          </p:blipFill>
-          <p:spPr>
-            <a:xfrm>
-              <a:off x="1366714" y="2857499"/>
-              <a:ext cx="3227396" cy="3227396"/>
-            </a:xfrm>
-            <a:prstGeom prst="rect">
-              <a:avLst/>
-            </a:prstGeom>
-          </p:spPr>
-        </p:pic>
-        <p:sp>
-          <p:nvSpPr>
-            <p:cNvPr id="13" name="TextBox 12"/>
-            <p:cNvSpPr txBox="1"/>
-            <p:nvPr/>
-          </p:nvSpPr>
-          <p:spPr>
-            <a:xfrm>
-              <a:off x="4538901" y="3970364"/>
-              <a:ext cx="7176315" cy="1146976"/>
-            </a:xfrm>
-            <a:prstGeom prst="rect">
-              <a:avLst/>
-            </a:prstGeom>
-            <a:noFill/>
-          </p:spPr>
-          <p:txBody>
-            <a:bodyPr wrap="square" rtlCol="0">
-              <a:spAutoFit/>
-            </a:bodyPr>
-            <a:lstStyle/>
-            <a:p>
-              <a:r>
-                <a:rPr lang="en-US" sz="1300" dirty="0"/>
-                <a:t>Dieses Kit </a:t>
-              </a:r>
-              <a:r>
-                <a:rPr lang="en-US" sz="1300" dirty="0" err="1"/>
-                <a:t>ist</a:t>
-              </a:r>
-              <a:r>
-                <a:rPr lang="en-US" sz="1300" dirty="0"/>
-                <a:t> Open-Source. </a:t>
-              </a:r>
-              <a:r>
-                <a:rPr lang="en-US" sz="1300" dirty="0" err="1"/>
-                <a:t>Informationen</a:t>
-              </a:r>
-              <a:r>
-                <a:rPr lang="en-US" sz="1300" dirty="0"/>
-                <a:t> </a:t>
-              </a:r>
-              <a:r>
-                <a:rPr lang="en-US" sz="1300" dirty="0" err="1"/>
-                <a:t>unter</a:t>
-              </a:r>
-              <a:r>
-                <a:rPr lang="en-US" sz="1300" dirty="0"/>
-                <a:t>: </a:t>
-              </a:r>
-            </a:p>
-            <a:p>
-              <a:r>
-                <a:rPr lang="en-US" sz="1300" dirty="0">
-                  <a:solidFill>
-                    <a:srgbClr val="0171C0"/>
-                  </a:solidFill>
-                </a:rPr>
-                <a:t>https://</a:t>
-              </a:r>
-              <a:r>
-                <a:rPr lang="en-US" sz="1300" dirty="0" err="1">
-                  <a:solidFill>
-                    <a:srgbClr val="0171C0"/>
-                  </a:solidFill>
-                </a:rPr>
-                <a:t>github.com</a:t>
-              </a:r>
-              <a:r>
-                <a:rPr lang="en-US" sz="1300" dirty="0">
-                  <a:solidFill>
-                    <a:srgbClr val="0171C0"/>
-                  </a:solidFill>
-                </a:rPr>
-                <a:t>/ScaleIT-Org/workshop-app-prototyping</a:t>
-              </a:r>
-            </a:p>
-            <a:p>
-              <a:endParaRPr lang="en-US" sz="1300" dirty="0"/>
-            </a:p>
-          </p:txBody>
-        </p:sp>
-        <p:sp>
-          <p:nvSpPr>
-            <p:cNvPr id="14" name="TextBox 13"/>
-            <p:cNvSpPr txBox="1"/>
-            <p:nvPr/>
-          </p:nvSpPr>
-          <p:spPr>
-            <a:xfrm>
-              <a:off x="4538901" y="4928047"/>
-              <a:ext cx="4783002" cy="1146977"/>
-            </a:xfrm>
-            <a:prstGeom prst="rect">
-              <a:avLst/>
-            </a:prstGeom>
-            <a:noFill/>
-          </p:spPr>
-          <p:txBody>
-            <a:bodyPr wrap="none" rtlCol="0">
-              <a:spAutoFit/>
-            </a:bodyPr>
-            <a:lstStyle/>
-            <a:p>
-              <a:r>
-                <a:rPr lang="de-DE" sz="1300" dirty="0"/>
-                <a:t>© KIT 2017, MIT Lizenz</a:t>
-              </a:r>
-            </a:p>
-            <a:p>
-              <a:r>
-                <a:rPr lang="de-DE" sz="1300" dirty="0"/>
-                <a:t>Andrei Miclaus, </a:t>
-              </a:r>
-              <a:r>
-                <a:rPr lang="de-DE" sz="1300" dirty="0">
-                  <a:solidFill>
-                    <a:srgbClr val="0171C0"/>
-                  </a:solidFill>
-                  <a:hlinkClick r:id="rId6"/>
-                </a:rPr>
-                <a:t>andrei.miclaus@kit.edu</a:t>
-              </a:r>
-              <a:endParaRPr lang="de-DE" sz="1300" dirty="0">
+          </a:blip>
+          <a:srcRect l="27188" t="39946" r="29219" b="40300"/>
+          <a:stretch/>
+        </p:blipFill>
+        <p:spPr>
+          <a:xfrm>
+            <a:off x="4436558" y="2215253"/>
+            <a:ext cx="2552792" cy="633771"/>
+          </a:xfrm>
+          <a:prstGeom prst="rect">
+            <a:avLst/>
+          </a:prstGeom>
+        </p:spPr>
+      </p:pic>
+      <p:sp>
+        <p:nvSpPr>
+          <p:cNvPr id="7" name="TextBox 6"/>
+          <p:cNvSpPr txBox="1"/>
+          <p:nvPr/>
+        </p:nvSpPr>
+        <p:spPr>
+          <a:xfrm>
+            <a:off x="4632563" y="2793462"/>
+            <a:ext cx="1987532" cy="292388"/>
+          </a:xfrm>
+          <a:prstGeom prst="rect">
+            <a:avLst/>
+          </a:prstGeom>
+          <a:noFill/>
+        </p:spPr>
+        <p:txBody>
+          <a:bodyPr wrap="none" rtlCol="0">
+            <a:spAutoFit/>
+          </a:bodyPr>
+          <a:lstStyle/>
+          <a:p>
+            <a:r>
+              <a:rPr lang="en-US" sz="1300" b="1" dirty="0"/>
+              <a:t>App Paper Prototyping Kit</a:t>
+            </a:r>
+          </a:p>
+        </p:txBody>
+      </p:sp>
+      <p:sp>
+        <p:nvSpPr>
+          <p:cNvPr id="13" name="TextBox 12"/>
+          <p:cNvSpPr txBox="1"/>
+          <p:nvPr/>
+        </p:nvSpPr>
+        <p:spPr>
+          <a:xfrm>
+            <a:off x="4436556" y="3815128"/>
+            <a:ext cx="4455195" cy="692497"/>
+          </a:xfrm>
+          <a:prstGeom prst="rect">
+            <a:avLst/>
+          </a:prstGeom>
+          <a:noFill/>
+        </p:spPr>
+        <p:txBody>
+          <a:bodyPr wrap="square" rtlCol="0">
+            <a:spAutoFit/>
+          </a:bodyPr>
+          <a:lstStyle/>
+          <a:p>
+            <a:r>
+              <a:rPr lang="en-US" sz="1300" dirty="0"/>
+              <a:t>Dieses Kit </a:t>
+            </a:r>
+            <a:r>
+              <a:rPr lang="en-US" sz="1300" dirty="0" err="1"/>
+              <a:t>ist</a:t>
+            </a:r>
+            <a:r>
+              <a:rPr lang="en-US" sz="1300" dirty="0"/>
+              <a:t> Open-Source. </a:t>
+            </a:r>
+            <a:r>
+              <a:rPr lang="en-US" sz="1300" dirty="0" err="1"/>
+              <a:t>Informationen</a:t>
+            </a:r>
+            <a:r>
+              <a:rPr lang="en-US" sz="1300" dirty="0"/>
+              <a:t> </a:t>
+            </a:r>
+            <a:r>
+              <a:rPr lang="en-US" sz="1300" dirty="0" err="1"/>
+              <a:t>unter</a:t>
+            </a:r>
+            <a:r>
+              <a:rPr lang="en-US" sz="1300" dirty="0"/>
+              <a:t>: </a:t>
+            </a:r>
+          </a:p>
+          <a:p>
+            <a:r>
+              <a:rPr lang="en-US" sz="1300" dirty="0">
                 <a:solidFill>
                   <a:srgbClr val="0171C0"/>
                 </a:solidFill>
-              </a:endParaRPr>
-            </a:p>
-            <a:p>
-              <a:r>
-                <a:rPr lang="de-DE" sz="1300" dirty="0"/>
-                <a:t>Laura Halbmann, </a:t>
-              </a:r>
-              <a:r>
-                <a:rPr lang="de-DE" sz="1300" dirty="0">
-                  <a:hlinkClick r:id="rId7"/>
-                </a:rPr>
-                <a:t>halbmann@teco.edu</a:t>
-              </a:r>
-              <a:endParaRPr lang="de-DE" sz="1300" dirty="0"/>
-            </a:p>
-          </p:txBody>
-        </p:sp>
-      </p:grpSp>
+              </a:rPr>
+              <a:t>https://</a:t>
+            </a:r>
+            <a:r>
+              <a:rPr lang="en-US" sz="1300" dirty="0" err="1">
+                <a:solidFill>
+                  <a:srgbClr val="0171C0"/>
+                </a:solidFill>
+              </a:rPr>
+              <a:t>github.com</a:t>
+            </a:r>
+            <a:r>
+              <a:rPr lang="en-US" sz="1300" dirty="0">
+                <a:solidFill>
+                  <a:srgbClr val="0171C0"/>
+                </a:solidFill>
+              </a:rPr>
+              <a:t>/ScaleIT-Org/workshop-app-prototyping</a:t>
+            </a:r>
+          </a:p>
+          <a:p>
+            <a:endParaRPr lang="en-US" sz="1300" dirty="0"/>
+          </a:p>
+        </p:txBody>
+      </p:sp>
+      <p:sp>
+        <p:nvSpPr>
+          <p:cNvPr id="14" name="TextBox 13"/>
+          <p:cNvSpPr txBox="1"/>
+          <p:nvPr/>
+        </p:nvSpPr>
+        <p:spPr>
+          <a:xfrm>
+            <a:off x="4436557" y="4393337"/>
+            <a:ext cx="2887779" cy="692497"/>
+          </a:xfrm>
+          <a:prstGeom prst="rect">
+            <a:avLst/>
+          </a:prstGeom>
+          <a:noFill/>
+        </p:spPr>
+        <p:txBody>
+          <a:bodyPr wrap="none" rtlCol="0">
+            <a:spAutoFit/>
+          </a:bodyPr>
+          <a:lstStyle/>
+          <a:p>
+            <a:r>
+              <a:rPr lang="de-DE" sz="1300" dirty="0"/>
+              <a:t>© KIT 2017, MIT Lizenz</a:t>
+            </a:r>
+          </a:p>
+          <a:p>
+            <a:r>
+              <a:rPr lang="de-DE" sz="1300" dirty="0"/>
+              <a:t>Andrei Miclaus, </a:t>
+            </a:r>
+            <a:r>
+              <a:rPr lang="de-DE" sz="1300" dirty="0">
+                <a:solidFill>
+                  <a:srgbClr val="0171C0"/>
+                </a:solidFill>
+                <a:hlinkClick r:id="rId3"/>
+              </a:rPr>
+              <a:t>andrei.miclaus@kit.edu</a:t>
+            </a:r>
+            <a:endParaRPr lang="de-DE" sz="1300" dirty="0">
+              <a:solidFill>
+                <a:srgbClr val="0171C0"/>
+              </a:solidFill>
+            </a:endParaRPr>
+          </a:p>
+          <a:p>
+            <a:r>
+              <a:rPr lang="de-DE" sz="1300" dirty="0"/>
+              <a:t>Laura Halbmann, </a:t>
+            </a:r>
+            <a:r>
+              <a:rPr lang="de-DE" sz="1300" dirty="0">
+                <a:hlinkClick r:id="rId4"/>
+              </a:rPr>
+              <a:t>halbmann@teco.edu</a:t>
+            </a:r>
+            <a:endParaRPr lang="de-DE" sz="1300" dirty="0"/>
+          </a:p>
+        </p:txBody>
+      </p:sp>
+      <p:pic>
+        <p:nvPicPr>
+          <p:cNvPr id="4" name="Picture 3">
+            <a:extLst>
+              <a:ext uri="{FF2B5EF4-FFF2-40B4-BE49-F238E27FC236}">
+                <a16:creationId xmlns:a16="http://schemas.microsoft.com/office/drawing/2014/main" id="{2836AAC7-1BD0-BA4E-95D2-E7F945325E4D}"/>
+              </a:ext>
+            </a:extLst>
+          </p:cNvPr>
+          <p:cNvPicPr>
+            <a:picLocks noChangeAspect="1"/>
+          </p:cNvPicPr>
+          <p:nvPr/>
+        </p:nvPicPr>
+        <p:blipFill rotWithShape="1">
+          <a:blip r:embed="rId5">
+            <a:extLst>
+              <a:ext uri="{28A0092B-C50C-407E-A947-70E740481C1C}">
+                <a14:useLocalDpi xmlns:a14="http://schemas.microsoft.com/office/drawing/2010/main" val="0"/>
+              </a:ext>
+            </a:extLst>
+          </a:blip>
+          <a:srcRect l="3042" t="3856" r="2118" b="2946"/>
+          <a:stretch/>
+        </p:blipFill>
+        <p:spPr>
+          <a:xfrm>
+            <a:off x="2469359" y="3183422"/>
+            <a:ext cx="1896728" cy="1863909"/>
+          </a:xfrm>
+          <a:prstGeom prst="rect">
+            <a:avLst/>
+          </a:prstGeom>
+        </p:spPr>
+      </p:pic>
+      <p:pic>
+        <p:nvPicPr>
+          <p:cNvPr id="1026" name="Picture 2" descr="Github Logotype">
+            <a:extLst>
+              <a:ext uri="{FF2B5EF4-FFF2-40B4-BE49-F238E27FC236}">
+                <a16:creationId xmlns:a16="http://schemas.microsoft.com/office/drawing/2014/main" id="{8567E197-7721-BA46-8576-B5D5B5B22921}"/>
+              </a:ext>
+            </a:extLst>
+          </p:cNvPr>
+          <p:cNvPicPr>
+            <a:picLocks noChangeAspect="1" noChangeArrowheads="1"/>
+          </p:cNvPicPr>
+          <p:nvPr/>
+        </p:nvPicPr>
+        <p:blipFill>
+          <a:blip r:embed="rId6">
+            <a:extLst>
+              <a:ext uri="{28A0092B-C50C-407E-A947-70E740481C1C}">
+                <a14:useLocalDpi xmlns:a14="http://schemas.microsoft.com/office/drawing/2010/main" val="0"/>
+              </a:ext>
+            </a:extLst>
+          </a:blip>
+          <a:srcRect/>
+          <a:stretch>
+            <a:fillRect/>
+          </a:stretch>
+        </p:blipFill>
+        <p:spPr bwMode="auto">
+          <a:xfrm>
+            <a:off x="4498682" y="3302837"/>
+            <a:ext cx="1059480" cy="275465"/>
+          </a:xfrm>
+          <a:prstGeom prst="rect">
+            <a:avLst/>
+          </a:prstGeom>
+          <a:noFill/>
+          <a:extLst>
+            <a:ext uri="{909E8E84-426E-40DD-AFC4-6F175D3DCCD1}">
+              <a14:hiddenFill xmlns:a14="http://schemas.microsoft.com/office/drawing/2010/main">
+                <a:solidFill>
+                  <a:srgbClr val="FFFFFF"/>
+                </a:solidFill>
+              </a14:hiddenFill>
+            </a:ext>
+          </a:extLst>
+        </p:spPr>
+      </p:pic>
+      <p:pic>
+        <p:nvPicPr>
+          <p:cNvPr id="1028" name="Picture 4" descr="Github Octocat">
+            <a:extLst>
+              <a:ext uri="{FF2B5EF4-FFF2-40B4-BE49-F238E27FC236}">
+                <a16:creationId xmlns:a16="http://schemas.microsoft.com/office/drawing/2014/main" id="{E731D7CF-D2EE-6942-BDDD-7F2A6BD0B101}"/>
+              </a:ext>
+            </a:extLst>
+          </p:cNvPr>
+          <p:cNvPicPr>
+            <a:picLocks noChangeAspect="1" noChangeArrowheads="1"/>
+          </p:cNvPicPr>
+          <p:nvPr/>
+        </p:nvPicPr>
+        <p:blipFill>
+          <a:blip r:embed="rId7">
+            <a:extLst>
+              <a:ext uri="{28A0092B-C50C-407E-A947-70E740481C1C}">
+                <a14:useLocalDpi xmlns:a14="http://schemas.microsoft.com/office/drawing/2010/main" val="0"/>
+              </a:ext>
+            </a:extLst>
+          </a:blip>
+          <a:srcRect/>
+          <a:stretch>
+            <a:fillRect/>
+          </a:stretch>
+        </p:blipFill>
+        <p:spPr bwMode="auto">
+          <a:xfrm>
+            <a:off x="5558162" y="3183422"/>
+            <a:ext cx="589432" cy="487621"/>
+          </a:xfrm>
+          <a:prstGeom prst="rect">
+            <a:avLst/>
+          </a:prstGeom>
+          <a:noFill/>
+          <a:extLst>
+            <a:ext uri="{909E8E84-426E-40DD-AFC4-6F175D3DCCD1}">
+              <a14:hiddenFill xmlns:a14="http://schemas.microsoft.com/office/drawing/2010/main">
+                <a:solidFill>
+                  <a:srgbClr val="FFFFFF"/>
+                </a:solidFill>
+              </a14:hiddenFill>
+            </a:ext>
+          </a:extLst>
+        </p:spPr>
+      </p:pic>
     </p:spTree>
     <p:extLst>
       <p:ext uri="{BB962C8B-B14F-4D97-AF65-F5344CB8AC3E}">
@@ -14771,104 +14773,52 @@
           <a:chExt cx="0" cy="0"/>
         </a:xfrm>
       </p:grpSpPr>
-      <p:grpSp>
-        <p:nvGrpSpPr>
-          <p:cNvPr id="4" name="Gruppieren 3">
+      <p:pic>
+        <p:nvPicPr>
+          <p:cNvPr id="2" name="Picture 1">
             <a:extLst>
               <a:ext uri="{FF2B5EF4-FFF2-40B4-BE49-F238E27FC236}">
-                <a16:creationId xmlns:a16="http://schemas.microsoft.com/office/drawing/2014/main" id="{D51B3255-5D89-47C0-885D-90DFEA35AF48}"/>
+                <a16:creationId xmlns:a16="http://schemas.microsoft.com/office/drawing/2014/main" id="{6D59C319-6AF3-D241-8AD7-ED34C87245C1}"/>
               </a:ext>
             </a:extLst>
           </p:cNvPr>
-          <p:cNvGrpSpPr/>
+          <p:cNvPicPr>
+            <a:picLocks noChangeAspect="1"/>
+          </p:cNvPicPr>
           <p:nvPr/>
-        </p:nvGrpSpPr>
-        <p:grpSpPr>
-          <a:xfrm>
-            <a:off x="276225" y="504825"/>
-            <a:ext cx="9353550" cy="5848350"/>
-            <a:chOff x="919093" y="1352550"/>
-            <a:chExt cx="7105650" cy="4152900"/>
+        </p:nvPicPr>
+        <p:blipFill>
+          <a:blip r:embed="rId2">
+            <a:extLst>
+              <a:ext uri="{BEBA8EAE-BF5A-486C-A8C5-ECC9F3942E4B}">
+                <a14:imgProps xmlns:a14="http://schemas.microsoft.com/office/drawing/2010/main">
+                  <a14:imgLayer r:embed="rId3">
+                    <a14:imgEffect>
+                      <a14:sharpenSoften amount="50000"/>
+                    </a14:imgEffect>
+                  </a14:imgLayer>
+                </a14:imgProps>
+              </a:ext>
+            </a:extLst>
+          </a:blip>
+          <a:stretch>
+            <a:fillRect/>
+          </a:stretch>
+        </p:blipFill>
+        <p:spPr>
+          <a:xfrm rot="16200000">
+            <a:off x="2034587" y="-997804"/>
+            <a:ext cx="5876636" cy="8994462"/>
           </a:xfrm>
-        </p:grpSpPr>
-        <p:pic>
-          <p:nvPicPr>
-            <p:cNvPr id="5" name="Grafik 4" descr="Ein Bild, das Screenshot enthält.&#10;&#10;Mit sehr hoher Zuverlässigkeit generierte Beschreibung">
-              <a:extLst>
-                <a:ext uri="{FF2B5EF4-FFF2-40B4-BE49-F238E27FC236}">
-                  <a16:creationId xmlns:a16="http://schemas.microsoft.com/office/drawing/2014/main" id="{7471903C-1380-4E06-95AD-1CA5FB8FB425}"/>
-                </a:ext>
-              </a:extLst>
-            </p:cNvPr>
-            <p:cNvPicPr>
-              <a:picLocks noChangeAspect="1"/>
-            </p:cNvPicPr>
-            <p:nvPr/>
-          </p:nvPicPr>
-          <p:blipFill>
-            <a:blip r:embed="rId2">
-              <a:extLst>
-                <a:ext uri="{28A0092B-C50C-407E-A947-70E740481C1C}">
-                  <a14:useLocalDpi xmlns:a14="http://schemas.microsoft.com/office/drawing/2010/main" val="0"/>
-                </a:ext>
-              </a:extLst>
-            </a:blip>
-            <a:stretch>
-              <a:fillRect/>
-            </a:stretch>
-          </p:blipFill>
-          <p:spPr>
-            <a:xfrm>
-              <a:off x="919093" y="1352550"/>
-              <a:ext cx="7105650" cy="4152900"/>
-            </a:xfrm>
-            <a:prstGeom prst="rect">
-              <a:avLst/>
-            </a:prstGeom>
-          </p:spPr>
-        </p:pic>
-        <p:pic>
-          <p:nvPicPr>
-            <p:cNvPr id="6" name="Inhaltsplatzhalter 3" title="ScaleIT_Logo">
-              <a:extLst>
-                <a:ext uri="{FF2B5EF4-FFF2-40B4-BE49-F238E27FC236}">
-                  <a16:creationId xmlns:a16="http://schemas.microsoft.com/office/drawing/2014/main" id="{C41A77B4-E3DE-4C37-B282-5A897ACEF70A}"/>
-                </a:ext>
-              </a:extLst>
-            </p:cNvPr>
-            <p:cNvPicPr>
-              <a:picLocks/>
-            </p:cNvPicPr>
-            <p:nvPr/>
-          </p:nvPicPr>
-          <p:blipFill>
-            <a:blip r:embed="rId3">
-              <a:biLevel thresh="75000"/>
-              <a:extLst>
-                <a:ext uri="{28A0092B-C50C-407E-A947-70E740481C1C}">
-                  <a14:useLocalDpi xmlns:a14="http://schemas.microsoft.com/office/drawing/2010/main" val="0"/>
-                </a:ext>
-              </a:extLst>
-            </a:blip>
-            <a:stretch>
-              <a:fillRect/>
-            </a:stretch>
-          </p:blipFill>
-          <p:spPr>
-            <a:xfrm>
-              <a:off x="4120078" y="1420410"/>
-              <a:ext cx="703679" cy="164764"/>
-            </a:xfrm>
-            <a:prstGeom prst="rect">
-              <a:avLst/>
-            </a:prstGeom>
-          </p:spPr>
-        </p:pic>
-      </p:grpSp>
+          <a:prstGeom prst="rect">
+            <a:avLst/>
+          </a:prstGeom>
+        </p:spPr>
+      </p:pic>
     </p:spTree>
     <p:extLst>
       <p:ext uri="{BB962C8B-B14F-4D97-AF65-F5344CB8AC3E}">
-        <p14:creationId xmlns:p14="http://schemas.microsoft.com/office/powerpoint/2010/main" val="207664725"/>
+        <p14:creationId xmlns:p14="http://schemas.microsoft.com/office/powerpoint/2010/main" val="79354714"/>
       </p:ext>
     </p:extLst>
   </p:cSld>
@@ -14895,104 +14845,52 @@
           <a:chExt cx="0" cy="0"/>
         </a:xfrm>
       </p:grpSpPr>
-      <p:grpSp>
-        <p:nvGrpSpPr>
-          <p:cNvPr id="4" name="Gruppieren 3">
+      <p:pic>
+        <p:nvPicPr>
+          <p:cNvPr id="2" name="Picture 1">
             <a:extLst>
               <a:ext uri="{FF2B5EF4-FFF2-40B4-BE49-F238E27FC236}">
-                <a16:creationId xmlns:a16="http://schemas.microsoft.com/office/drawing/2014/main" id="{D51B3255-5D89-47C0-885D-90DFEA35AF48}"/>
+                <a16:creationId xmlns:a16="http://schemas.microsoft.com/office/drawing/2014/main" id="{6D59C319-6AF3-D241-8AD7-ED34C87245C1}"/>
               </a:ext>
             </a:extLst>
           </p:cNvPr>
-          <p:cNvGrpSpPr/>
+          <p:cNvPicPr>
+            <a:picLocks noChangeAspect="1"/>
+          </p:cNvPicPr>
           <p:nvPr/>
-        </p:nvGrpSpPr>
-        <p:grpSpPr>
-          <a:xfrm>
-            <a:off x="276225" y="504825"/>
-            <a:ext cx="9353550" cy="5848350"/>
-            <a:chOff x="919093" y="1352550"/>
-            <a:chExt cx="7105650" cy="4152900"/>
+        </p:nvPicPr>
+        <p:blipFill>
+          <a:blip r:embed="rId2">
+            <a:extLst>
+              <a:ext uri="{BEBA8EAE-BF5A-486C-A8C5-ECC9F3942E4B}">
+                <a14:imgProps xmlns:a14="http://schemas.microsoft.com/office/drawing/2010/main">
+                  <a14:imgLayer r:embed="rId3">
+                    <a14:imgEffect>
+                      <a14:sharpenSoften amount="50000"/>
+                    </a14:imgEffect>
+                  </a14:imgLayer>
+                </a14:imgProps>
+              </a:ext>
+            </a:extLst>
+          </a:blip>
+          <a:stretch>
+            <a:fillRect/>
+          </a:stretch>
+        </p:blipFill>
+        <p:spPr>
+          <a:xfrm rot="16200000">
+            <a:off x="2034587" y="-997804"/>
+            <a:ext cx="5876636" cy="8994462"/>
           </a:xfrm>
-        </p:grpSpPr>
-        <p:pic>
-          <p:nvPicPr>
-            <p:cNvPr id="5" name="Grafik 4" descr="Ein Bild, das Screenshot enthält.&#10;&#10;Mit sehr hoher Zuverlässigkeit generierte Beschreibung">
-              <a:extLst>
-                <a:ext uri="{FF2B5EF4-FFF2-40B4-BE49-F238E27FC236}">
-                  <a16:creationId xmlns:a16="http://schemas.microsoft.com/office/drawing/2014/main" id="{7471903C-1380-4E06-95AD-1CA5FB8FB425}"/>
-                </a:ext>
-              </a:extLst>
-            </p:cNvPr>
-            <p:cNvPicPr>
-              <a:picLocks noChangeAspect="1"/>
-            </p:cNvPicPr>
-            <p:nvPr/>
-          </p:nvPicPr>
-          <p:blipFill>
-            <a:blip r:embed="rId2">
-              <a:extLst>
-                <a:ext uri="{28A0092B-C50C-407E-A947-70E740481C1C}">
-                  <a14:useLocalDpi xmlns:a14="http://schemas.microsoft.com/office/drawing/2010/main" val="0"/>
-                </a:ext>
-              </a:extLst>
-            </a:blip>
-            <a:stretch>
-              <a:fillRect/>
-            </a:stretch>
-          </p:blipFill>
-          <p:spPr>
-            <a:xfrm>
-              <a:off x="919093" y="1352550"/>
-              <a:ext cx="7105650" cy="4152900"/>
-            </a:xfrm>
-            <a:prstGeom prst="rect">
-              <a:avLst/>
-            </a:prstGeom>
-          </p:spPr>
-        </p:pic>
-        <p:pic>
-          <p:nvPicPr>
-            <p:cNvPr id="6" name="Inhaltsplatzhalter 3" title="ScaleIT_Logo">
-              <a:extLst>
-                <a:ext uri="{FF2B5EF4-FFF2-40B4-BE49-F238E27FC236}">
-                  <a16:creationId xmlns:a16="http://schemas.microsoft.com/office/drawing/2014/main" id="{C41A77B4-E3DE-4C37-B282-5A897ACEF70A}"/>
-                </a:ext>
-              </a:extLst>
-            </p:cNvPr>
-            <p:cNvPicPr>
-              <a:picLocks/>
-            </p:cNvPicPr>
-            <p:nvPr/>
-          </p:nvPicPr>
-          <p:blipFill>
-            <a:blip r:embed="rId3">
-              <a:biLevel thresh="75000"/>
-              <a:extLst>
-                <a:ext uri="{28A0092B-C50C-407E-A947-70E740481C1C}">
-                  <a14:useLocalDpi xmlns:a14="http://schemas.microsoft.com/office/drawing/2010/main" val="0"/>
-                </a:ext>
-              </a:extLst>
-            </a:blip>
-            <a:stretch>
-              <a:fillRect/>
-            </a:stretch>
-          </p:blipFill>
-          <p:spPr>
-            <a:xfrm>
-              <a:off x="4120078" y="1420410"/>
-              <a:ext cx="703679" cy="164764"/>
-            </a:xfrm>
-            <a:prstGeom prst="rect">
-              <a:avLst/>
-            </a:prstGeom>
-          </p:spPr>
-        </p:pic>
-      </p:grpSp>
+          <a:prstGeom prst="rect">
+            <a:avLst/>
+          </a:prstGeom>
+        </p:spPr>
+      </p:pic>
     </p:spTree>
     <p:extLst>
       <p:ext uri="{BB962C8B-B14F-4D97-AF65-F5344CB8AC3E}">
-        <p14:creationId xmlns:p14="http://schemas.microsoft.com/office/powerpoint/2010/main" val="2554900847"/>
+        <p14:creationId xmlns:p14="http://schemas.microsoft.com/office/powerpoint/2010/main" val="2698930361"/>
       </p:ext>
     </p:extLst>
   </p:cSld>

</xml_diff>